<commit_message>
update presentation and notebook with histograms
presentation still missing difference encoding slide
</commit_message>
<xml_diff>
--- a/Parth viva presentation.pptx
+++ b/Parth viva presentation.pptx
@@ -168,7 +168,7 @@
           <a:noFill/>
           <a:extLst>
             <a:ext uri="{909E8E84-426E-40dd-AFC4-6F175D3DCCD1}">
-              <a14:hiddenFill xmlns="" xmlns:a14="http://schemas.microsoft.com/office/drawing/2010/main">
+              <a14:hiddenFill xmlns:a14="http://schemas.microsoft.com/office/drawing/2010/main" xmlns="">
                 <a:solidFill>
                   <a:srgbClr val="FFFFFF"/>
                 </a:solidFill>
@@ -228,7 +228,7 @@
             </a:ln>
             <a:extLst>
               <a:ext uri="{91240B29-F687-4f45-9708-019B960494DF}">
-                <a14:hiddenLine xmlns="" xmlns:a14="http://schemas.microsoft.com/office/drawing/2010/main" w="9525">
+                <a14:hiddenLine xmlns:a14="http://schemas.microsoft.com/office/drawing/2010/main" xmlns="" w="9525">
                   <a:solidFill>
                     <a:srgbClr val="000000"/>
                   </a:solidFill>
@@ -318,7 +318,7 @@
             </a:ln>
             <a:extLst>
               <a:ext uri="{91240B29-F687-4f45-9708-019B960494DF}">
-                <a14:hiddenLine xmlns="" xmlns:a14="http://schemas.microsoft.com/office/drawing/2010/main" w="9525">
+                <a14:hiddenLine xmlns:a14="http://schemas.microsoft.com/office/drawing/2010/main" xmlns="" w="9525">
                   <a:solidFill>
                     <a:srgbClr val="000000"/>
                   </a:solidFill>
@@ -408,7 +408,7 @@
             </a:ln>
             <a:extLst>
               <a:ext uri="{91240B29-F687-4f45-9708-019B960494DF}">
-                <a14:hiddenLine xmlns="" xmlns:a14="http://schemas.microsoft.com/office/drawing/2010/main" w="9525">
+                <a14:hiddenLine xmlns:a14="http://schemas.microsoft.com/office/drawing/2010/main" xmlns="" w="9525">
                   <a:solidFill>
                     <a:srgbClr val="000000"/>
                   </a:solidFill>
@@ -442,7 +442,7 @@
             </a:ln>
             <a:extLst>
               <a:ext uri="{91240B29-F687-4f45-9708-019B960494DF}">
-                <a14:hiddenLine xmlns="" xmlns:a14="http://schemas.microsoft.com/office/drawing/2010/main" w="9525">
+                <a14:hiddenLine xmlns:a14="http://schemas.microsoft.com/office/drawing/2010/main" xmlns="" w="9525">
                   <a:solidFill>
                     <a:srgbClr val="000000"/>
                   </a:solidFill>
@@ -532,7 +532,7 @@
             </a:ln>
             <a:extLst>
               <a:ext uri="{91240B29-F687-4f45-9708-019B960494DF}">
-                <a14:hiddenLine xmlns="" xmlns:a14="http://schemas.microsoft.com/office/drawing/2010/main" w="9525">
+                <a14:hiddenLine xmlns:a14="http://schemas.microsoft.com/office/drawing/2010/main" xmlns="" w="9525">
                   <a:solidFill>
                     <a:srgbClr val="000000"/>
                   </a:solidFill>
@@ -594,7 +594,7 @@
             </a:ln>
             <a:extLst>
               <a:ext uri="{91240B29-F687-4f45-9708-019B960494DF}">
-                <a14:hiddenLine xmlns="" xmlns:a14="http://schemas.microsoft.com/office/drawing/2010/main" w="9525">
+                <a14:hiddenLine xmlns:a14="http://schemas.microsoft.com/office/drawing/2010/main" xmlns="" w="9525">
                   <a:solidFill>
                     <a:srgbClr val="000000"/>
                   </a:solidFill>
@@ -656,7 +656,7 @@
             </a:ln>
             <a:extLst>
               <a:ext uri="{91240B29-F687-4f45-9708-019B960494DF}">
-                <a14:hiddenLine xmlns="" xmlns:a14="http://schemas.microsoft.com/office/drawing/2010/main" w="9525">
+                <a14:hiddenLine xmlns:a14="http://schemas.microsoft.com/office/drawing/2010/main" xmlns="" w="9525">
                   <a:solidFill>
                     <a:srgbClr val="000000"/>
                   </a:solidFill>
@@ -746,7 +746,7 @@
             </a:ln>
             <a:extLst>
               <a:ext uri="{91240B29-F687-4f45-9708-019B960494DF}">
-                <a14:hiddenLine xmlns="" xmlns:a14="http://schemas.microsoft.com/office/drawing/2010/main" w="9525">
+                <a14:hiddenLine xmlns:a14="http://schemas.microsoft.com/office/drawing/2010/main" xmlns="" w="9525">
                   <a:solidFill>
                     <a:srgbClr val="000000"/>
                   </a:solidFill>
@@ -808,7 +808,7 @@
             </a:ln>
             <a:extLst>
               <a:ext uri="{91240B29-F687-4f45-9708-019B960494DF}">
-                <a14:hiddenLine xmlns="" xmlns:a14="http://schemas.microsoft.com/office/drawing/2010/main" w="9525">
+                <a14:hiddenLine xmlns:a14="http://schemas.microsoft.com/office/drawing/2010/main" xmlns="" w="9525">
                   <a:solidFill>
                     <a:srgbClr val="000000"/>
                   </a:solidFill>
@@ -870,7 +870,7 @@
             </a:ln>
             <a:extLst>
               <a:ext uri="{91240B29-F687-4f45-9708-019B960494DF}">
-                <a14:hiddenLine xmlns="" xmlns:a14="http://schemas.microsoft.com/office/drawing/2010/main" w="9525">
+                <a14:hiddenLine xmlns:a14="http://schemas.microsoft.com/office/drawing/2010/main" xmlns="" w="9525">
                   <a:solidFill>
                     <a:srgbClr val="000000"/>
                   </a:solidFill>
@@ -960,7 +960,7 @@
             </a:ln>
             <a:extLst>
               <a:ext uri="{91240B29-F687-4f45-9708-019B960494DF}">
-                <a14:hiddenLine xmlns="" xmlns:a14="http://schemas.microsoft.com/office/drawing/2010/main" w="9525">
+                <a14:hiddenLine xmlns:a14="http://schemas.microsoft.com/office/drawing/2010/main" xmlns="" w="9525">
                   <a:solidFill>
                     <a:srgbClr val="000000"/>
                   </a:solidFill>
@@ -1050,7 +1050,7 @@
             </a:ln>
             <a:extLst>
               <a:ext uri="{91240B29-F687-4f45-9708-019B960494DF}">
-                <a14:hiddenLine xmlns="" xmlns:a14="http://schemas.microsoft.com/office/drawing/2010/main" w="9525">
+                <a14:hiddenLine xmlns:a14="http://schemas.microsoft.com/office/drawing/2010/main" xmlns="" w="9525">
                   <a:solidFill>
                     <a:srgbClr val="000000"/>
                   </a:solidFill>
@@ -1112,7 +1112,7 @@
             </a:ln>
             <a:extLst>
               <a:ext uri="{91240B29-F687-4f45-9708-019B960494DF}">
-                <a14:hiddenLine xmlns="" xmlns:a14="http://schemas.microsoft.com/office/drawing/2010/main" w="9525">
+                <a14:hiddenLine xmlns:a14="http://schemas.microsoft.com/office/drawing/2010/main" xmlns="" w="9525">
                   <a:solidFill>
                     <a:srgbClr val="000000"/>
                   </a:solidFill>
@@ -1222,7 +1222,7 @@
             </a:ln>
             <a:extLst>
               <a:ext uri="{91240B29-F687-4f45-9708-019B960494DF}">
-                <a14:hiddenLine xmlns="" xmlns:a14="http://schemas.microsoft.com/office/drawing/2010/main" w="9525">
+                <a14:hiddenLine xmlns:a14="http://schemas.microsoft.com/office/drawing/2010/main" xmlns="" w="9525">
                   <a:solidFill>
                     <a:srgbClr val="000000"/>
                   </a:solidFill>
@@ -1284,7 +1284,7 @@
             </a:ln>
             <a:extLst>
               <a:ext uri="{91240B29-F687-4f45-9708-019B960494DF}">
-                <a14:hiddenLine xmlns="" xmlns:a14="http://schemas.microsoft.com/office/drawing/2010/main" w="9525">
+                <a14:hiddenLine xmlns:a14="http://schemas.microsoft.com/office/drawing/2010/main" xmlns="" w="9525">
                   <a:solidFill>
                     <a:srgbClr val="000000"/>
                   </a:solidFill>
@@ -1374,7 +1374,7 @@
             </a:ln>
             <a:extLst>
               <a:ext uri="{91240B29-F687-4f45-9708-019B960494DF}">
-                <a14:hiddenLine xmlns="" xmlns:a14="http://schemas.microsoft.com/office/drawing/2010/main" w="9525">
+                <a14:hiddenLine xmlns:a14="http://schemas.microsoft.com/office/drawing/2010/main" xmlns="" w="9525">
                   <a:solidFill>
                     <a:srgbClr val="000000"/>
                   </a:solidFill>
@@ -1464,7 +1464,7 @@
             </a:ln>
             <a:extLst>
               <a:ext uri="{91240B29-F687-4f45-9708-019B960494DF}">
-                <a14:hiddenLine xmlns="" xmlns:a14="http://schemas.microsoft.com/office/drawing/2010/main" w="9525">
+                <a14:hiddenLine xmlns:a14="http://schemas.microsoft.com/office/drawing/2010/main" xmlns="" w="9525">
                   <a:solidFill>
                     <a:srgbClr val="000000"/>
                   </a:solidFill>
@@ -1526,7 +1526,7 @@
             </a:ln>
             <a:extLst>
               <a:ext uri="{91240B29-F687-4f45-9708-019B960494DF}">
-                <a14:hiddenLine xmlns="" xmlns:a14="http://schemas.microsoft.com/office/drawing/2010/main" w="9525">
+                <a14:hiddenLine xmlns:a14="http://schemas.microsoft.com/office/drawing/2010/main" xmlns="" w="9525">
                   <a:solidFill>
                     <a:srgbClr val="000000"/>
                   </a:solidFill>
@@ -1616,7 +1616,7 @@
             </a:ln>
             <a:extLst>
               <a:ext uri="{91240B29-F687-4f45-9708-019B960494DF}">
-                <a14:hiddenLine xmlns="" xmlns:a14="http://schemas.microsoft.com/office/drawing/2010/main" w="9525">
+                <a14:hiddenLine xmlns:a14="http://schemas.microsoft.com/office/drawing/2010/main" xmlns="" w="9525">
                   <a:solidFill>
                     <a:srgbClr val="000000"/>
                   </a:solidFill>
@@ -1706,7 +1706,7 @@
             </a:ln>
             <a:extLst>
               <a:ext uri="{91240B29-F687-4f45-9708-019B960494DF}">
-                <a14:hiddenLine xmlns="" xmlns:a14="http://schemas.microsoft.com/office/drawing/2010/main" w="9525">
+                <a14:hiddenLine xmlns:a14="http://schemas.microsoft.com/office/drawing/2010/main" xmlns="" w="9525">
                   <a:solidFill>
                     <a:srgbClr val="000000"/>
                   </a:solidFill>
@@ -1762,7 +1762,7 @@
             </a:ln>
             <a:extLst>
               <a:ext uri="{91240B29-F687-4f45-9708-019B960494DF}">
-                <a14:hiddenLine xmlns="" xmlns:a14="http://schemas.microsoft.com/office/drawing/2010/main" w="9525">
+                <a14:hiddenLine xmlns:a14="http://schemas.microsoft.com/office/drawing/2010/main" xmlns="" w="9525">
                   <a:solidFill>
                     <a:srgbClr val="000000"/>
                   </a:solidFill>
@@ -1852,7 +1852,7 @@
             </a:ln>
             <a:extLst>
               <a:ext uri="{91240B29-F687-4f45-9708-019B960494DF}">
-                <a14:hiddenLine xmlns="" xmlns:a14="http://schemas.microsoft.com/office/drawing/2010/main" w="9525">
+                <a14:hiddenLine xmlns:a14="http://schemas.microsoft.com/office/drawing/2010/main" xmlns="" w="9525">
                   <a:solidFill>
                     <a:srgbClr val="000000"/>
                   </a:solidFill>
@@ -1908,7 +1908,7 @@
             </a:ln>
             <a:extLst>
               <a:ext uri="{91240B29-F687-4f45-9708-019B960494DF}">
-                <a14:hiddenLine xmlns="" xmlns:a14="http://schemas.microsoft.com/office/drawing/2010/main" w="9525">
+                <a14:hiddenLine xmlns:a14="http://schemas.microsoft.com/office/drawing/2010/main" xmlns="" w="9525">
                   <a:solidFill>
                     <a:srgbClr val="000000"/>
                   </a:solidFill>
@@ -1998,7 +1998,7 @@
             </a:ln>
             <a:extLst>
               <a:ext uri="{91240B29-F687-4f45-9708-019B960494DF}">
-                <a14:hiddenLine xmlns="" xmlns:a14="http://schemas.microsoft.com/office/drawing/2010/main" w="9525">
+                <a14:hiddenLine xmlns:a14="http://schemas.microsoft.com/office/drawing/2010/main" xmlns="" w="9525">
                   <a:solidFill>
                     <a:srgbClr val="000000"/>
                   </a:solidFill>
@@ -2066,7 +2066,7 @@
             </a:ln>
             <a:extLst>
               <a:ext uri="{91240B29-F687-4f45-9708-019B960494DF}">
-                <a14:hiddenLine xmlns="" xmlns:a14="http://schemas.microsoft.com/office/drawing/2010/main" w="9525">
+                <a14:hiddenLine xmlns:a14="http://schemas.microsoft.com/office/drawing/2010/main" xmlns="" w="9525">
                   <a:solidFill>
                     <a:srgbClr val="000000"/>
                   </a:solidFill>
@@ -2156,7 +2156,7 @@
             </a:ln>
             <a:extLst>
               <a:ext uri="{91240B29-F687-4f45-9708-019B960494DF}">
-                <a14:hiddenLine xmlns="" xmlns:a14="http://schemas.microsoft.com/office/drawing/2010/main" w="9525">
+                <a14:hiddenLine xmlns:a14="http://schemas.microsoft.com/office/drawing/2010/main" xmlns="" w="9525">
                   <a:solidFill>
                     <a:srgbClr val="000000"/>
                   </a:solidFill>
@@ -2224,7 +2224,7 @@
             </a:ln>
             <a:extLst>
               <a:ext uri="{91240B29-F687-4f45-9708-019B960494DF}">
-                <a14:hiddenLine xmlns="" xmlns:a14="http://schemas.microsoft.com/office/drawing/2010/main" w="9525">
+                <a14:hiddenLine xmlns:a14="http://schemas.microsoft.com/office/drawing/2010/main" xmlns="" w="9525">
                   <a:solidFill>
                     <a:srgbClr val="000000"/>
                   </a:solidFill>
@@ -2314,7 +2314,7 @@
             </a:ln>
             <a:extLst>
               <a:ext uri="{91240B29-F687-4f45-9708-019B960494DF}">
-                <a14:hiddenLine xmlns="" xmlns:a14="http://schemas.microsoft.com/office/drawing/2010/main" w="9525">
+                <a14:hiddenLine xmlns:a14="http://schemas.microsoft.com/office/drawing/2010/main" xmlns="" w="9525">
                   <a:solidFill>
                     <a:srgbClr val="000000"/>
                   </a:solidFill>
@@ -2348,7 +2348,7 @@
             </a:ln>
             <a:extLst>
               <a:ext uri="{91240B29-F687-4f45-9708-019B960494DF}">
-                <a14:hiddenLine xmlns="" xmlns:a14="http://schemas.microsoft.com/office/drawing/2010/main" w="9525">
+                <a14:hiddenLine xmlns:a14="http://schemas.microsoft.com/office/drawing/2010/main" xmlns="" w="9525">
                   <a:solidFill>
                     <a:srgbClr val="000000"/>
                   </a:solidFill>
@@ -2438,7 +2438,7 @@
             </a:ln>
             <a:extLst>
               <a:ext uri="{91240B29-F687-4f45-9708-019B960494DF}">
-                <a14:hiddenLine xmlns="" xmlns:a14="http://schemas.microsoft.com/office/drawing/2010/main" w="9525">
+                <a14:hiddenLine xmlns:a14="http://schemas.microsoft.com/office/drawing/2010/main" xmlns="" w="9525">
                   <a:solidFill>
                     <a:srgbClr val="000000"/>
                   </a:solidFill>
@@ -2500,7 +2500,7 @@
             </a:ln>
             <a:extLst>
               <a:ext uri="{91240B29-F687-4f45-9708-019B960494DF}">
-                <a14:hiddenLine xmlns="" xmlns:a14="http://schemas.microsoft.com/office/drawing/2010/main" w="9525">
+                <a14:hiddenLine xmlns:a14="http://schemas.microsoft.com/office/drawing/2010/main" xmlns="" w="9525">
                   <a:solidFill>
                     <a:srgbClr val="000000"/>
                   </a:solidFill>
@@ -2562,7 +2562,7 @@
             </a:ln>
             <a:extLst>
               <a:ext uri="{91240B29-F687-4f45-9708-019B960494DF}">
-                <a14:hiddenLine xmlns="" xmlns:a14="http://schemas.microsoft.com/office/drawing/2010/main" w="9525">
+                <a14:hiddenLine xmlns:a14="http://schemas.microsoft.com/office/drawing/2010/main" xmlns="" w="9525">
                   <a:solidFill>
                     <a:srgbClr val="000000"/>
                   </a:solidFill>
@@ -2652,7 +2652,7 @@
             </a:ln>
             <a:extLst>
               <a:ext uri="{91240B29-F687-4f45-9708-019B960494DF}">
-                <a14:hiddenLine xmlns="" xmlns:a14="http://schemas.microsoft.com/office/drawing/2010/main" w="9525">
+                <a14:hiddenLine xmlns:a14="http://schemas.microsoft.com/office/drawing/2010/main" xmlns="" w="9525">
                   <a:solidFill>
                     <a:srgbClr val="000000"/>
                   </a:solidFill>
@@ -2720,7 +2720,7 @@
             </a:ln>
             <a:extLst>
               <a:ext uri="{91240B29-F687-4f45-9708-019B960494DF}">
-                <a14:hiddenLine xmlns="" xmlns:a14="http://schemas.microsoft.com/office/drawing/2010/main" w="9525">
+                <a14:hiddenLine xmlns:a14="http://schemas.microsoft.com/office/drawing/2010/main" xmlns="" w="9525">
                   <a:solidFill>
                     <a:srgbClr val="000000"/>
                   </a:solidFill>
@@ -2782,7 +2782,7 @@
             </a:ln>
             <a:extLst>
               <a:ext uri="{91240B29-F687-4f45-9708-019B960494DF}">
-                <a14:hiddenLine xmlns="" xmlns:a14="http://schemas.microsoft.com/office/drawing/2010/main" w="9525">
+                <a14:hiddenLine xmlns:a14="http://schemas.microsoft.com/office/drawing/2010/main" xmlns="" w="9525">
                   <a:solidFill>
                     <a:srgbClr val="000000"/>
                   </a:solidFill>
@@ -2872,7 +2872,7 @@
             </a:ln>
             <a:extLst>
               <a:ext uri="{91240B29-F687-4f45-9708-019B960494DF}">
-                <a14:hiddenLine xmlns="" xmlns:a14="http://schemas.microsoft.com/office/drawing/2010/main" w="9525">
+                <a14:hiddenLine xmlns:a14="http://schemas.microsoft.com/office/drawing/2010/main" xmlns="" w="9525">
                   <a:solidFill>
                     <a:srgbClr val="000000"/>
                   </a:solidFill>
@@ -2934,7 +2934,7 @@
             </a:ln>
             <a:extLst>
               <a:ext uri="{91240B29-F687-4f45-9708-019B960494DF}">
-                <a14:hiddenLine xmlns="" xmlns:a14="http://schemas.microsoft.com/office/drawing/2010/main" w="9525">
+                <a14:hiddenLine xmlns:a14="http://schemas.microsoft.com/office/drawing/2010/main" xmlns="" w="9525">
                   <a:solidFill>
                     <a:srgbClr val="000000"/>
                   </a:solidFill>
@@ -3024,7 +3024,7 @@
             </a:ln>
             <a:extLst>
               <a:ext uri="{91240B29-F687-4f45-9708-019B960494DF}">
-                <a14:hiddenLine xmlns="" xmlns:a14="http://schemas.microsoft.com/office/drawing/2010/main" w="9525">
+                <a14:hiddenLine xmlns:a14="http://schemas.microsoft.com/office/drawing/2010/main" xmlns="" w="9525">
                   <a:solidFill>
                     <a:srgbClr val="000000"/>
                   </a:solidFill>
@@ -3086,7 +3086,7 @@
             </a:ln>
             <a:extLst>
               <a:ext uri="{91240B29-F687-4f45-9708-019B960494DF}">
-                <a14:hiddenLine xmlns="" xmlns:a14="http://schemas.microsoft.com/office/drawing/2010/main" w="9525">
+                <a14:hiddenLine xmlns:a14="http://schemas.microsoft.com/office/drawing/2010/main" xmlns="" w="9525">
                   <a:solidFill>
                     <a:srgbClr val="000000"/>
                   </a:solidFill>
@@ -3176,7 +3176,7 @@
             </a:ln>
             <a:extLst>
               <a:ext uri="{91240B29-F687-4f45-9708-019B960494DF}">
-                <a14:hiddenLine xmlns="" xmlns:a14="http://schemas.microsoft.com/office/drawing/2010/main" w="9525">
+                <a14:hiddenLine xmlns:a14="http://schemas.microsoft.com/office/drawing/2010/main" xmlns="" w="9525">
                   <a:solidFill>
                     <a:srgbClr val="000000"/>
                   </a:solidFill>
@@ -3210,7 +3210,7 @@
             </a:ln>
             <a:extLst>
               <a:ext uri="{91240B29-F687-4f45-9708-019B960494DF}">
-                <a14:hiddenLine xmlns="" xmlns:a14="http://schemas.microsoft.com/office/drawing/2010/main" w="9525">
+                <a14:hiddenLine xmlns:a14="http://schemas.microsoft.com/office/drawing/2010/main" xmlns="" w="9525">
                   <a:solidFill>
                     <a:srgbClr val="000000"/>
                   </a:solidFill>
@@ -3275,7 +3275,7 @@
             </a:ln>
             <a:extLst>
               <a:ext uri="{91240B29-F687-4f45-9708-019B960494DF}">
-                <a14:hiddenLine xmlns="" xmlns:a14="http://schemas.microsoft.com/office/drawing/2010/main" w="9525">
+                <a14:hiddenLine xmlns:a14="http://schemas.microsoft.com/office/drawing/2010/main" xmlns="" w="9525">
                   <a:solidFill>
                     <a:srgbClr val="000000"/>
                   </a:solidFill>
@@ -3365,7 +3365,7 @@
             </a:ln>
             <a:extLst>
               <a:ext uri="{91240B29-F687-4f45-9708-019B960494DF}">
-                <a14:hiddenLine xmlns="" xmlns:a14="http://schemas.microsoft.com/office/drawing/2010/main" w="9525">
+                <a14:hiddenLine xmlns:a14="http://schemas.microsoft.com/office/drawing/2010/main" xmlns="" w="9525">
                   <a:solidFill>
                     <a:srgbClr val="000000"/>
                   </a:solidFill>
@@ -3427,7 +3427,7 @@
             </a:ln>
             <a:extLst>
               <a:ext uri="{91240B29-F687-4f45-9708-019B960494DF}">
-                <a14:hiddenLine xmlns="" xmlns:a14="http://schemas.microsoft.com/office/drawing/2010/main" w="9525">
+                <a14:hiddenLine xmlns:a14="http://schemas.microsoft.com/office/drawing/2010/main" xmlns="" w="9525">
                   <a:solidFill>
                     <a:srgbClr val="000000"/>
                   </a:solidFill>
@@ -3517,7 +3517,7 @@
             </a:ln>
             <a:extLst>
               <a:ext uri="{91240B29-F687-4f45-9708-019B960494DF}">
-                <a14:hiddenLine xmlns="" xmlns:a14="http://schemas.microsoft.com/office/drawing/2010/main" w="9525">
+                <a14:hiddenLine xmlns:a14="http://schemas.microsoft.com/office/drawing/2010/main" xmlns="" w="9525">
                   <a:solidFill>
                     <a:srgbClr val="000000"/>
                   </a:solidFill>
@@ -3607,7 +3607,7 @@
             </a:ln>
             <a:extLst>
               <a:ext uri="{91240B29-F687-4f45-9708-019B960494DF}">
-                <a14:hiddenLine xmlns="" xmlns:a14="http://schemas.microsoft.com/office/drawing/2010/main" w="9525">
+                <a14:hiddenLine xmlns:a14="http://schemas.microsoft.com/office/drawing/2010/main" xmlns="" w="9525">
                   <a:solidFill>
                     <a:srgbClr val="000000"/>
                   </a:solidFill>
@@ -3672,7 +3672,7 @@
             </a:ln>
             <a:extLst>
               <a:ext uri="{91240B29-F687-4f45-9708-019B960494DF}">
-                <a14:hiddenLine xmlns="" xmlns:a14="http://schemas.microsoft.com/office/drawing/2010/main" w="9525">
+                <a14:hiddenLine xmlns:a14="http://schemas.microsoft.com/office/drawing/2010/main" xmlns="" w="9525">
                   <a:solidFill>
                     <a:srgbClr val="000000"/>
                   </a:solidFill>
@@ -3734,7 +3734,7 @@
             </a:ln>
             <a:extLst>
               <a:ext uri="{91240B29-F687-4f45-9708-019B960494DF}">
-                <a14:hiddenLine xmlns="" xmlns:a14="http://schemas.microsoft.com/office/drawing/2010/main" w="9525">
+                <a14:hiddenLine xmlns:a14="http://schemas.microsoft.com/office/drawing/2010/main" xmlns="" w="9525">
                   <a:solidFill>
                     <a:srgbClr val="000000"/>
                   </a:solidFill>
@@ -3824,7 +3824,7 @@
             </a:ln>
             <a:extLst>
               <a:ext uri="{91240B29-F687-4f45-9708-019B960494DF}">
-                <a14:hiddenLine xmlns="" xmlns:a14="http://schemas.microsoft.com/office/drawing/2010/main" w="9525">
+                <a14:hiddenLine xmlns:a14="http://schemas.microsoft.com/office/drawing/2010/main" xmlns="" w="9525">
                   <a:solidFill>
                     <a:srgbClr val="000000"/>
                   </a:solidFill>
@@ -3914,7 +3914,7 @@
             </a:ln>
             <a:extLst>
               <a:ext uri="{91240B29-F687-4f45-9708-019B960494DF}">
-                <a14:hiddenLine xmlns="" xmlns:a14="http://schemas.microsoft.com/office/drawing/2010/main" w="9525">
+                <a14:hiddenLine xmlns:a14="http://schemas.microsoft.com/office/drawing/2010/main" xmlns="" w="9525">
                   <a:solidFill>
                     <a:srgbClr val="000000"/>
                   </a:solidFill>
@@ -3976,7 +3976,7 @@
             </a:ln>
             <a:extLst>
               <a:ext uri="{91240B29-F687-4f45-9708-019B960494DF}">
-                <a14:hiddenLine xmlns="" xmlns:a14="http://schemas.microsoft.com/office/drawing/2010/main" w="9525">
+                <a14:hiddenLine xmlns:a14="http://schemas.microsoft.com/office/drawing/2010/main" xmlns="" w="9525">
                   <a:solidFill>
                     <a:srgbClr val="000000"/>
                   </a:solidFill>
@@ -4096,7 +4096,7 @@
             </a:ln>
             <a:extLst>
               <a:ext uri="{91240B29-F687-4f45-9708-019B960494DF}">
-                <a14:hiddenLine xmlns="" xmlns:a14="http://schemas.microsoft.com/office/drawing/2010/main" w="9525">
+                <a14:hiddenLine xmlns:a14="http://schemas.microsoft.com/office/drawing/2010/main" xmlns="" w="9525">
                   <a:solidFill>
                     <a:srgbClr val="000000"/>
                   </a:solidFill>
@@ -4164,7 +4164,7 @@
             </a:ln>
             <a:extLst>
               <a:ext uri="{91240B29-F687-4f45-9708-019B960494DF}">
-                <a14:hiddenLine xmlns="" xmlns:a14="http://schemas.microsoft.com/office/drawing/2010/main" w="9525">
+                <a14:hiddenLine xmlns:a14="http://schemas.microsoft.com/office/drawing/2010/main" xmlns="" w="9525">
                   <a:solidFill>
                     <a:srgbClr val="000000"/>
                   </a:solidFill>
@@ -4254,7 +4254,7 @@
             </a:ln>
             <a:extLst>
               <a:ext uri="{91240B29-F687-4f45-9708-019B960494DF}">
-                <a14:hiddenLine xmlns="" xmlns:a14="http://schemas.microsoft.com/office/drawing/2010/main" w="9525">
+                <a14:hiddenLine xmlns:a14="http://schemas.microsoft.com/office/drawing/2010/main" xmlns="" w="9525">
                   <a:solidFill>
                     <a:srgbClr val="000000"/>
                   </a:solidFill>
@@ -9061,7 +9061,7 @@
           <a:noFill/>
           <a:extLst>
             <a:ext uri="{909E8E84-426E-40dd-AFC4-6F175D3DCCD1}">
-              <a14:hiddenFill xmlns="" xmlns:a14="http://schemas.microsoft.com/office/drawing/2010/main">
+              <a14:hiddenFill xmlns:a14="http://schemas.microsoft.com/office/drawing/2010/main" xmlns="">
                 <a:solidFill>
                   <a:srgbClr val="FFFFFF"/>
                 </a:solidFill>
@@ -9135,7 +9135,7 @@
               </a:ln>
               <a:extLst>
                 <a:ext uri="{91240B29-F687-4f45-9708-019B960494DF}">
-                  <a14:hiddenLine xmlns="" xmlns:a14="http://schemas.microsoft.com/office/drawing/2010/main" w="9525">
+                  <a14:hiddenLine xmlns:a14="http://schemas.microsoft.com/office/drawing/2010/main" xmlns="" w="9525">
                     <a:solidFill>
                       <a:srgbClr val="000000"/>
                     </a:solidFill>
@@ -9225,7 +9225,7 @@
               </a:ln>
               <a:extLst>
                 <a:ext uri="{91240B29-F687-4f45-9708-019B960494DF}">
-                  <a14:hiddenLine xmlns="" xmlns:a14="http://schemas.microsoft.com/office/drawing/2010/main" w="9525">
+                  <a14:hiddenLine xmlns:a14="http://schemas.microsoft.com/office/drawing/2010/main" xmlns="" w="9525">
                     <a:solidFill>
                       <a:srgbClr val="000000"/>
                     </a:solidFill>
@@ -9315,7 +9315,7 @@
               </a:ln>
               <a:extLst>
                 <a:ext uri="{91240B29-F687-4f45-9708-019B960494DF}">
-                  <a14:hiddenLine xmlns="" xmlns:a14="http://schemas.microsoft.com/office/drawing/2010/main" w="9525">
+                  <a14:hiddenLine xmlns:a14="http://schemas.microsoft.com/office/drawing/2010/main" xmlns="" w="9525">
                     <a:solidFill>
                       <a:srgbClr val="000000"/>
                     </a:solidFill>
@@ -9377,7 +9377,7 @@
               </a:ln>
               <a:extLst>
                 <a:ext uri="{91240B29-F687-4f45-9708-019B960494DF}">
-                  <a14:hiddenLine xmlns="" xmlns:a14="http://schemas.microsoft.com/office/drawing/2010/main" w="9525">
+                  <a14:hiddenLine xmlns:a14="http://schemas.microsoft.com/office/drawing/2010/main" xmlns="" w="9525">
                     <a:solidFill>
                       <a:srgbClr val="000000"/>
                     </a:solidFill>
@@ -9467,7 +9467,7 @@
               </a:ln>
               <a:extLst>
                 <a:ext uri="{91240B29-F687-4f45-9708-019B960494DF}">
-                  <a14:hiddenLine xmlns="" xmlns:a14="http://schemas.microsoft.com/office/drawing/2010/main" w="9525">
+                  <a14:hiddenLine xmlns:a14="http://schemas.microsoft.com/office/drawing/2010/main" xmlns="" w="9525">
                     <a:solidFill>
                       <a:srgbClr val="000000"/>
                     </a:solidFill>
@@ -9529,7 +9529,7 @@
               </a:ln>
               <a:extLst>
                 <a:ext uri="{91240B29-F687-4f45-9708-019B960494DF}">
-                  <a14:hiddenLine xmlns="" xmlns:a14="http://schemas.microsoft.com/office/drawing/2010/main" w="9525">
+                  <a14:hiddenLine xmlns:a14="http://schemas.microsoft.com/office/drawing/2010/main" xmlns="" w="9525">
                     <a:solidFill>
                       <a:srgbClr val="000000"/>
                     </a:solidFill>
@@ -9591,7 +9591,7 @@
               </a:ln>
               <a:extLst>
                 <a:ext uri="{91240B29-F687-4f45-9708-019B960494DF}">
-                  <a14:hiddenLine xmlns="" xmlns:a14="http://schemas.microsoft.com/office/drawing/2010/main" w="9525">
+                  <a14:hiddenLine xmlns:a14="http://schemas.microsoft.com/office/drawing/2010/main" xmlns="" w="9525">
                     <a:solidFill>
                       <a:srgbClr val="000000"/>
                     </a:solidFill>
@@ -9681,7 +9681,7 @@
               </a:ln>
               <a:extLst>
                 <a:ext uri="{91240B29-F687-4f45-9708-019B960494DF}">
-                  <a14:hiddenLine xmlns="" xmlns:a14="http://schemas.microsoft.com/office/drawing/2010/main" w="9525">
+                  <a14:hiddenLine xmlns:a14="http://schemas.microsoft.com/office/drawing/2010/main" xmlns="" w="9525">
                     <a:solidFill>
                       <a:srgbClr val="000000"/>
                     </a:solidFill>
@@ -9771,7 +9771,7 @@
               </a:ln>
               <a:extLst>
                 <a:ext uri="{91240B29-F687-4f45-9708-019B960494DF}">
-                  <a14:hiddenLine xmlns="" xmlns:a14="http://schemas.microsoft.com/office/drawing/2010/main" w="9525">
+                  <a14:hiddenLine xmlns:a14="http://schemas.microsoft.com/office/drawing/2010/main" xmlns="" w="9525">
                     <a:solidFill>
                       <a:srgbClr val="000000"/>
                     </a:solidFill>
@@ -9833,7 +9833,7 @@
               </a:ln>
               <a:extLst>
                 <a:ext uri="{91240B29-F687-4f45-9708-019B960494DF}">
-                  <a14:hiddenLine xmlns="" xmlns:a14="http://schemas.microsoft.com/office/drawing/2010/main" w="9525">
+                  <a14:hiddenLine xmlns:a14="http://schemas.microsoft.com/office/drawing/2010/main" xmlns="" w="9525">
                     <a:solidFill>
                       <a:srgbClr val="000000"/>
                     </a:solidFill>
@@ -9943,7 +9943,7 @@
               </a:ln>
               <a:extLst>
                 <a:ext uri="{91240B29-F687-4f45-9708-019B960494DF}">
-                  <a14:hiddenLine xmlns="" xmlns:a14="http://schemas.microsoft.com/office/drawing/2010/main" w="9525">
+                  <a14:hiddenLine xmlns:a14="http://schemas.microsoft.com/office/drawing/2010/main" xmlns="" w="9525">
                     <a:solidFill>
                       <a:srgbClr val="000000"/>
                     </a:solidFill>
@@ -10027,7 +10027,7 @@
               </a:ln>
               <a:extLst>
                 <a:ext uri="{91240B29-F687-4f45-9708-019B960494DF}">
-                  <a14:hiddenLine xmlns="" xmlns:a14="http://schemas.microsoft.com/office/drawing/2010/main" w="9525">
+                  <a14:hiddenLine xmlns:a14="http://schemas.microsoft.com/office/drawing/2010/main" xmlns="" w="9525">
                     <a:solidFill>
                       <a:srgbClr val="000000"/>
                     </a:solidFill>
@@ -10089,7 +10089,7 @@
               </a:ln>
               <a:extLst>
                 <a:ext uri="{91240B29-F687-4f45-9708-019B960494DF}">
-                  <a14:hiddenLine xmlns="" xmlns:a14="http://schemas.microsoft.com/office/drawing/2010/main" w="9525">
+                  <a14:hiddenLine xmlns:a14="http://schemas.microsoft.com/office/drawing/2010/main" xmlns="" w="9525">
                     <a:solidFill>
                       <a:srgbClr val="000000"/>
                     </a:solidFill>
@@ -10151,7 +10151,7 @@
               </a:ln>
               <a:extLst>
                 <a:ext uri="{91240B29-F687-4f45-9708-019B960494DF}">
-                  <a14:hiddenLine xmlns="" xmlns:a14="http://schemas.microsoft.com/office/drawing/2010/main" w="9525">
+                  <a14:hiddenLine xmlns:a14="http://schemas.microsoft.com/office/drawing/2010/main" xmlns="" w="9525">
                     <a:solidFill>
                       <a:srgbClr val="000000"/>
                     </a:solidFill>
@@ -10241,7 +10241,7 @@
               </a:ln>
               <a:extLst>
                 <a:ext uri="{91240B29-F687-4f45-9708-019B960494DF}">
-                  <a14:hiddenLine xmlns="" xmlns:a14="http://schemas.microsoft.com/office/drawing/2010/main" w="9525">
+                  <a14:hiddenLine xmlns:a14="http://schemas.microsoft.com/office/drawing/2010/main" xmlns="" w="9525">
                     <a:solidFill>
                       <a:srgbClr val="000000"/>
                     </a:solidFill>
@@ -10275,7 +10275,7 @@
               </a:ln>
               <a:extLst>
                 <a:ext uri="{91240B29-F687-4f45-9708-019B960494DF}">
-                  <a14:hiddenLine xmlns="" xmlns:a14="http://schemas.microsoft.com/office/drawing/2010/main" w="9525">
+                  <a14:hiddenLine xmlns:a14="http://schemas.microsoft.com/office/drawing/2010/main" xmlns="" w="9525">
                     <a:solidFill>
                       <a:srgbClr val="000000"/>
                     </a:solidFill>
@@ -10340,7 +10340,7 @@
               </a:ln>
               <a:extLst>
                 <a:ext uri="{91240B29-F687-4f45-9708-019B960494DF}">
-                  <a14:hiddenLine xmlns="" xmlns:a14="http://schemas.microsoft.com/office/drawing/2010/main" w="9525">
+                  <a14:hiddenLine xmlns:a14="http://schemas.microsoft.com/office/drawing/2010/main" xmlns="" w="9525">
                     <a:solidFill>
                       <a:srgbClr val="000000"/>
                     </a:solidFill>
@@ -10430,7 +10430,7 @@
               </a:ln>
               <a:extLst>
                 <a:ext uri="{91240B29-F687-4f45-9708-019B960494DF}">
-                  <a14:hiddenLine xmlns="" xmlns:a14="http://schemas.microsoft.com/office/drawing/2010/main" w="9525">
+                  <a14:hiddenLine xmlns:a14="http://schemas.microsoft.com/office/drawing/2010/main" xmlns="" w="9525">
                     <a:solidFill>
                       <a:srgbClr val="000000"/>
                     </a:solidFill>
@@ -10492,7 +10492,7 @@
               </a:ln>
               <a:extLst>
                 <a:ext uri="{91240B29-F687-4f45-9708-019B960494DF}">
-                  <a14:hiddenLine xmlns="" xmlns:a14="http://schemas.microsoft.com/office/drawing/2010/main" w="9525">
+                  <a14:hiddenLine xmlns:a14="http://schemas.microsoft.com/office/drawing/2010/main" xmlns="" w="9525">
                     <a:solidFill>
                       <a:srgbClr val="000000"/>
                     </a:solidFill>
@@ -10582,7 +10582,7 @@
               </a:ln>
               <a:extLst>
                 <a:ext uri="{91240B29-F687-4f45-9708-019B960494DF}">
-                  <a14:hiddenLine xmlns="" xmlns:a14="http://schemas.microsoft.com/office/drawing/2010/main" w="9525">
+                  <a14:hiddenLine xmlns:a14="http://schemas.microsoft.com/office/drawing/2010/main" xmlns="" w="9525">
                     <a:solidFill>
                       <a:srgbClr val="000000"/>
                     </a:solidFill>
@@ -10647,7 +10647,7 @@
               </a:ln>
               <a:extLst>
                 <a:ext uri="{91240B29-F687-4f45-9708-019B960494DF}">
-                  <a14:hiddenLine xmlns="" xmlns:a14="http://schemas.microsoft.com/office/drawing/2010/main" w="9525">
+                  <a14:hiddenLine xmlns:a14="http://schemas.microsoft.com/office/drawing/2010/main" xmlns="" w="9525">
                     <a:solidFill>
                       <a:srgbClr val="000000"/>
                     </a:solidFill>
@@ -10709,7 +10709,7 @@
               </a:ln>
               <a:extLst>
                 <a:ext uri="{91240B29-F687-4f45-9708-019B960494DF}">
-                  <a14:hiddenLine xmlns="" xmlns:a14="http://schemas.microsoft.com/office/drawing/2010/main" w="9525">
+                  <a14:hiddenLine xmlns:a14="http://schemas.microsoft.com/office/drawing/2010/main" xmlns="" w="9525">
                     <a:solidFill>
                       <a:srgbClr val="000000"/>
                     </a:solidFill>
@@ -10799,7 +10799,7 @@
               </a:ln>
               <a:extLst>
                 <a:ext uri="{91240B29-F687-4f45-9708-019B960494DF}">
-                  <a14:hiddenLine xmlns="" xmlns:a14="http://schemas.microsoft.com/office/drawing/2010/main" w="9525">
+                  <a14:hiddenLine xmlns:a14="http://schemas.microsoft.com/office/drawing/2010/main" xmlns="" w="9525">
                     <a:solidFill>
                       <a:srgbClr val="000000"/>
                     </a:solidFill>
@@ -10889,7 +10889,7 @@
               </a:ln>
               <a:extLst>
                 <a:ext uri="{91240B29-F687-4f45-9708-019B960494DF}">
-                  <a14:hiddenLine xmlns="" xmlns:a14="http://schemas.microsoft.com/office/drawing/2010/main" w="9525">
+                  <a14:hiddenLine xmlns:a14="http://schemas.microsoft.com/office/drawing/2010/main" xmlns="" w="9525">
                     <a:solidFill>
                       <a:srgbClr val="000000"/>
                     </a:solidFill>
@@ -10954,7 +10954,7 @@
               </a:ln>
               <a:extLst>
                 <a:ext uri="{91240B29-F687-4f45-9708-019B960494DF}">
-                  <a14:hiddenLine xmlns="" xmlns:a14="http://schemas.microsoft.com/office/drawing/2010/main" w="9525">
+                  <a14:hiddenLine xmlns:a14="http://schemas.microsoft.com/office/drawing/2010/main" xmlns="" w="9525">
                     <a:solidFill>
                       <a:srgbClr val="000000"/>
                     </a:solidFill>
@@ -11074,7 +11074,7 @@
               </a:ln>
               <a:extLst>
                 <a:ext uri="{91240B29-F687-4f45-9708-019B960494DF}">
-                  <a14:hiddenLine xmlns="" xmlns:a14="http://schemas.microsoft.com/office/drawing/2010/main" w="9525">
+                  <a14:hiddenLine xmlns:a14="http://schemas.microsoft.com/office/drawing/2010/main" xmlns="" w="9525">
                     <a:solidFill>
                       <a:srgbClr val="000000"/>
                     </a:solidFill>
@@ -11172,7 +11172,7 @@
               </a:ln>
               <a:extLst>
                 <a:ext uri="{91240B29-F687-4f45-9708-019B960494DF}">
-                  <a14:hiddenLine xmlns="" xmlns:a14="http://schemas.microsoft.com/office/drawing/2010/main" w="9525">
+                  <a14:hiddenLine xmlns:a14="http://schemas.microsoft.com/office/drawing/2010/main" xmlns="" w="9525">
                     <a:solidFill>
                       <a:srgbClr val="000000"/>
                     </a:solidFill>
@@ -11287,7 +11287,7 @@
               </a:ln>
               <a:extLst>
                 <a:ext uri="{91240B29-F687-4f45-9708-019B960494DF}">
-                  <a14:hiddenLine xmlns="" xmlns:a14="http://schemas.microsoft.com/office/drawing/2010/main" w="9525">
+                  <a14:hiddenLine xmlns:a14="http://schemas.microsoft.com/office/drawing/2010/main" xmlns="" w="9525">
                     <a:solidFill>
                       <a:srgbClr val="000000"/>
                     </a:solidFill>
@@ -11377,7 +11377,7 @@
               </a:ln>
               <a:extLst>
                 <a:ext uri="{91240B29-F687-4f45-9708-019B960494DF}">
-                  <a14:hiddenLine xmlns="" xmlns:a14="http://schemas.microsoft.com/office/drawing/2010/main" w="9525">
+                  <a14:hiddenLine xmlns:a14="http://schemas.microsoft.com/office/drawing/2010/main" xmlns="" w="9525">
                     <a:solidFill>
                       <a:srgbClr val="000000"/>
                     </a:solidFill>
@@ -11442,7 +11442,7 @@
               </a:ln>
               <a:extLst>
                 <a:ext uri="{91240B29-F687-4f45-9708-019B960494DF}">
-                  <a14:hiddenLine xmlns="" xmlns:a14="http://schemas.microsoft.com/office/drawing/2010/main" w="9525">
+                  <a14:hiddenLine xmlns:a14="http://schemas.microsoft.com/office/drawing/2010/main" xmlns="" w="9525">
                     <a:solidFill>
                       <a:srgbClr val="000000"/>
                     </a:solidFill>
@@ -11532,7 +11532,7 @@
               </a:ln>
               <a:extLst>
                 <a:ext uri="{91240B29-F687-4f45-9708-019B960494DF}">
-                  <a14:hiddenLine xmlns="" xmlns:a14="http://schemas.microsoft.com/office/drawing/2010/main" w="9525">
+                  <a14:hiddenLine xmlns:a14="http://schemas.microsoft.com/office/drawing/2010/main" xmlns="" w="9525">
                     <a:solidFill>
                       <a:srgbClr val="000000"/>
                     </a:solidFill>
@@ -11600,7 +11600,7 @@
               </a:ln>
               <a:extLst>
                 <a:ext uri="{91240B29-F687-4f45-9708-019B960494DF}">
-                  <a14:hiddenLine xmlns="" xmlns:a14="http://schemas.microsoft.com/office/drawing/2010/main" w="9525">
+                  <a14:hiddenLine xmlns:a14="http://schemas.microsoft.com/office/drawing/2010/main" xmlns="" w="9525">
                     <a:solidFill>
                       <a:srgbClr val="000000"/>
                     </a:solidFill>
@@ -11690,7 +11690,7 @@
               </a:ln>
               <a:extLst>
                 <a:ext uri="{91240B29-F687-4f45-9708-019B960494DF}">
-                  <a14:hiddenLine xmlns="" xmlns:a14="http://schemas.microsoft.com/office/drawing/2010/main" w="9525">
+                  <a14:hiddenLine xmlns:a14="http://schemas.microsoft.com/office/drawing/2010/main" xmlns="" w="9525">
                     <a:solidFill>
                       <a:srgbClr val="000000"/>
                     </a:solidFill>
@@ -11758,7 +11758,7 @@
               </a:ln>
               <a:extLst>
                 <a:ext uri="{91240B29-F687-4f45-9708-019B960494DF}">
-                  <a14:hiddenLine xmlns="" xmlns:a14="http://schemas.microsoft.com/office/drawing/2010/main" w="9525">
+                  <a14:hiddenLine xmlns:a14="http://schemas.microsoft.com/office/drawing/2010/main" xmlns="" w="9525">
                     <a:solidFill>
                       <a:srgbClr val="000000"/>
                     </a:solidFill>
@@ -11848,7 +11848,7 @@
               </a:ln>
               <a:extLst>
                 <a:ext uri="{91240B29-F687-4f45-9708-019B960494DF}">
-                  <a14:hiddenLine xmlns="" xmlns:a14="http://schemas.microsoft.com/office/drawing/2010/main" w="9525">
+                  <a14:hiddenLine xmlns:a14="http://schemas.microsoft.com/office/drawing/2010/main" xmlns="" w="9525">
                     <a:solidFill>
                       <a:srgbClr val="000000"/>
                     </a:solidFill>
@@ -11882,7 +11882,7 @@
               </a:ln>
               <a:extLst>
                 <a:ext uri="{91240B29-F687-4f45-9708-019B960494DF}">
-                  <a14:hiddenLine xmlns="" xmlns:a14="http://schemas.microsoft.com/office/drawing/2010/main" w="9525">
+                  <a14:hiddenLine xmlns:a14="http://schemas.microsoft.com/office/drawing/2010/main" xmlns="" w="9525">
                     <a:solidFill>
                       <a:srgbClr val="000000"/>
                     </a:solidFill>
@@ -12750,6 +12750,30 @@
 <file path=ppt/slides/slide4.xml><?xml version="1.0" encoding="utf-8"?>
 <p:sld xmlns:a="http://schemas.openxmlformats.org/drawingml/2006/main" xmlns:r="http://schemas.openxmlformats.org/officeDocument/2006/relationships" xmlns:p="http://schemas.openxmlformats.org/presentationml/2006/main">
   <p:cSld>
+    <p:bg>
+      <p:bgPr>
+        <a:blipFill>
+          <a:blip r:embed="rId2">
+            <a:duotone>
+              <a:schemeClr val="bg2">
+                <a:shade val="88000"/>
+                <a:hueMod val="106000"/>
+                <a:satMod val="140000"/>
+                <a:lumMod val="54000"/>
+              </a:schemeClr>
+              <a:schemeClr val="bg2">
+                <a:tint val="98000"/>
+                <a:hueMod val="90000"/>
+                <a:satMod val="150000"/>
+                <a:lumMod val="160000"/>
+              </a:schemeClr>
+            </a:duotone>
+          </a:blip>
+          <a:stretch/>
+        </a:blipFill>
+        <a:effectLst/>
+      </p:bgPr>
+    </p:bg>
     <p:spTree>
       <p:nvGrpSpPr>
         <p:cNvPr id="1" name=""/>
@@ -12782,21 +12806,19 @@
         </p:nvSpPr>
         <p:spPr>
           <a:xfrm>
-            <a:off x="1141413" y="376618"/>
-            <a:ext cx="9905998" cy="1478570"/>
+            <a:off x="6569957" y="618518"/>
+            <a:ext cx="4747088" cy="1478570"/>
           </a:xfrm>
         </p:spPr>
         <p:txBody>
-          <a:bodyPr/>
+          <a:bodyPr>
+            <a:normAutofit/>
+          </a:bodyPr>
           <a:lstStyle/>
           <a:p>
             <a:r>
-              <a:rPr lang="en-GB" dirty="0"/>
-              <a:t>Huffman </a:t>
-            </a:r>
-            <a:r>
-              <a:rPr lang="en-GB" dirty="0" err="1"/>
-              <a:t>enCoding</a:t>
+              <a:rPr lang="en-GB"/>
+              <a:t>Huffman enCoding</a:t>
             </a:r>
             <a:endParaRPr lang="en-GB" dirty="0"/>
           </a:p>
@@ -12804,35 +12826,90 @@
       </p:sp>
       <p:sp>
         <p:nvSpPr>
-          <p:cNvPr id="3" name="Content Placeholder 2">
+          <p:cNvPr id="73" name="Round Diagonal Corner Rectangle 9">
             <a:extLst>
               <a:ext uri="{FF2B5EF4-FFF2-40B4-BE49-F238E27FC236}">
-                <a16:creationId xmlns:a16="http://schemas.microsoft.com/office/drawing/2014/main" id="{DE20419A-F660-4A2E-AFD1-01F8E2A403CF}"/>
+                <a16:creationId xmlns:a16="http://schemas.microsoft.com/office/drawing/2014/main" id="{A3D1FEF8-5149-4AC1-8D77-B256637FB797}"/>
+              </a:ext>
+              <a:ext uri="{C183D7F6-B498-43B3-948B-1728B52AA6E4}">
+                <adec:decorative xmlns:adec="http://schemas.microsoft.com/office/drawing/2017/decorative" val="1"/>
               </a:ext>
             </a:extLst>
           </p:cNvPr>
           <p:cNvSpPr>
-            <a:spLocks noGrp="1"/>
+            <a:spLocks noGrp="1" noRot="1" noChangeAspect="1" noMove="1" noResize="1" noEditPoints="1" noAdjustHandles="1" noChangeArrowheads="1" noChangeShapeType="1" noTextEdit="1"/>
           </p:cNvSpPr>
           <p:nvPr>
-            <p:ph idx="1"/>
+            <p:extLst>
+              <p:ext uri="{386F3935-93C4-4BCD-93E2-E3B085C9AB24}">
+                <p16:designElem xmlns:p16="http://schemas.microsoft.com/office/powerpoint/2015/main" val="1"/>
+              </p:ext>
+            </p:extLst>
           </p:nvPr>
         </p:nvSpPr>
-        <p:spPr/>
+        <p:spPr>
+          <a:xfrm>
+            <a:off x="798950" y="808057"/>
+            <a:ext cx="5286376" cy="5234394"/>
+          </a:xfrm>
+          <a:prstGeom prst="round2DiagRect">
+            <a:avLst>
+              <a:gd name="adj1" fmla="val 7418"/>
+              <a:gd name="adj2" fmla="val 0"/>
+            </a:avLst>
+          </a:prstGeom>
+          <a:solidFill>
+            <a:srgbClr val="FFFFFF"/>
+          </a:solidFill>
+          <a:ln w="19050" cap="sq">
+            <a:solidFill>
+              <a:schemeClr val="tx2">
+                <a:lumMod val="60000"/>
+                <a:lumOff val="40000"/>
+                <a:alpha val="60000"/>
+              </a:schemeClr>
+            </a:solidFill>
+            <a:miter lim="800000"/>
+          </a:ln>
+          <a:effectLst>
+            <a:outerShdw blurRad="88900" dist="38100" dir="5400000" algn="t" rotWithShape="0">
+              <a:prstClr val="black">
+                <a:alpha val="40000"/>
+              </a:prstClr>
+            </a:outerShdw>
+          </a:effectLst>
+        </p:spPr>
+        <p:style>
+          <a:lnRef idx="2">
+            <a:schemeClr val="accent1">
+              <a:shade val="50000"/>
+            </a:schemeClr>
+          </a:lnRef>
+          <a:fillRef idx="1">
+            <a:schemeClr val="accent1"/>
+          </a:fillRef>
+          <a:effectRef idx="0">
+            <a:schemeClr val="accent1"/>
+          </a:effectRef>
+          <a:fontRef idx="minor">
+            <a:schemeClr val="lt1"/>
+          </a:fontRef>
+        </p:style>
         <p:txBody>
-          <a:bodyPr/>
+          <a:bodyPr rtlCol="0" anchor="ctr"/>
           <a:lstStyle/>
           <a:p>
-            <a:endParaRPr lang="en-GB" dirty="0"/>
+            <a:pPr algn="ctr"/>
+            <a:endParaRPr lang="en-US"/>
           </a:p>
         </p:txBody>
       </p:sp>
       <p:pic>
         <p:nvPicPr>
-          <p:cNvPr id="2050" name="Picture 2">
+          <p:cNvPr id="1028" name="Picture 4">
             <a:extLst>
               <a:ext uri="{FF2B5EF4-FFF2-40B4-BE49-F238E27FC236}">
-                <a16:creationId xmlns:a16="http://schemas.microsoft.com/office/drawing/2014/main" id="{783DA378-9346-44CD-8D1A-72C037DBFD24}"/>
+                <a16:creationId xmlns:a16="http://schemas.microsoft.com/office/drawing/2014/main" id="{5259CFED-301B-4929-A283-A6E7017717B8}"/>
               </a:ext>
             </a:extLst>
           </p:cNvPr>
@@ -12842,22 +12919,21 @@
           <p:nvPr/>
         </p:nvPicPr>
         <p:blipFill>
-          <a:blip r:embed="rId2">
+          <a:blip r:embed="rId3">
             <a:extLst>
               <a:ext uri="{28A0092B-C50C-407E-A947-70E740481C1C}">
                 <a14:useLocalDpi xmlns:a14="http://schemas.microsoft.com/office/drawing/2010/main" val="0"/>
               </a:ext>
             </a:extLst>
           </a:blip>
-          <a:srcRect/>
           <a:stretch>
             <a:fillRect/>
           </a:stretch>
         </p:blipFill>
         <p:spPr bwMode="auto">
           <a:xfrm>
-            <a:off x="5985588" y="1470172"/>
-            <a:ext cx="5810056" cy="3343275"/>
+            <a:off x="787157" y="1173464"/>
+            <a:ext cx="5286375" cy="2154198"/>
           </a:xfrm>
           <a:prstGeom prst="rect">
             <a:avLst/>
@@ -12876,10 +12952,10 @@
       </p:pic>
       <p:pic>
         <p:nvPicPr>
-          <p:cNvPr id="2052" name="Picture 4">
+          <p:cNvPr id="1026" name="Picture 2">
             <a:extLst>
               <a:ext uri="{FF2B5EF4-FFF2-40B4-BE49-F238E27FC236}">
-                <a16:creationId xmlns:a16="http://schemas.microsoft.com/office/drawing/2014/main" id="{222407B6-286C-4EEB-91FE-E25B4F96D2B5}"/>
+                <a16:creationId xmlns:a16="http://schemas.microsoft.com/office/drawing/2014/main" id="{D278D38B-346A-4CDF-B165-0BA69A876CB7}"/>
               </a:ext>
             </a:extLst>
           </p:cNvPr>
@@ -12889,22 +12965,21 @@
           <p:nvPr/>
         </p:nvPicPr>
         <p:blipFill>
-          <a:blip r:embed="rId3">
+          <a:blip r:embed="rId4">
             <a:extLst>
               <a:ext uri="{28A0092B-C50C-407E-A947-70E740481C1C}">
                 <a14:useLocalDpi xmlns:a14="http://schemas.microsoft.com/office/drawing/2010/main" val="0"/>
               </a:ext>
             </a:extLst>
           </a:blip>
-          <a:srcRect/>
           <a:stretch>
             <a:fillRect/>
           </a:stretch>
         </p:blipFill>
         <p:spPr bwMode="auto">
           <a:xfrm>
-            <a:off x="102637" y="1470171"/>
-            <a:ext cx="5551714" cy="3343275"/>
+            <a:off x="787157" y="3539645"/>
+            <a:ext cx="5286375" cy="2154198"/>
           </a:xfrm>
           <a:prstGeom prst="rect">
             <a:avLst/>
@@ -12921,6 +12996,55 @@
           </a:extLst>
         </p:spPr>
       </p:pic>
+      <p:sp>
+        <p:nvSpPr>
+          <p:cNvPr id="3" name="Content Placeholder 2">
+            <a:extLst>
+              <a:ext uri="{FF2B5EF4-FFF2-40B4-BE49-F238E27FC236}">
+                <a16:creationId xmlns:a16="http://schemas.microsoft.com/office/drawing/2014/main" id="{DE20419A-F660-4A2E-AFD1-01F8E2A403CF}"/>
+              </a:ext>
+            </a:extLst>
+          </p:cNvPr>
+          <p:cNvSpPr>
+            <a:spLocks noGrp="1"/>
+          </p:cNvSpPr>
+          <p:nvPr>
+            <p:ph idx="1"/>
+          </p:nvPr>
+        </p:nvSpPr>
+        <p:spPr>
+          <a:xfrm>
+            <a:off x="6569957" y="2249487"/>
+            <a:ext cx="4747087" cy="3541714"/>
+          </a:xfrm>
+        </p:spPr>
+        <p:txBody>
+          <a:bodyPr>
+            <a:normAutofit/>
+          </a:bodyPr>
+          <a:lstStyle/>
+          <a:p>
+            <a:pPr>
+              <a:buFont typeface="Wingdings" panose="05000000000000000000" pitchFamily="2" charset="2"/>
+              <a:buChar char="Ø"/>
+            </a:pPr>
+            <a:r>
+              <a:rPr lang="en-GB" dirty="0"/>
+              <a:t>Compression ratio centred around 85% for 50 readings and 95% for 350 readings</a:t>
+            </a:r>
+          </a:p>
+          <a:p>
+            <a:pPr>
+              <a:buFont typeface="Wingdings" panose="05000000000000000000" pitchFamily="2" charset="2"/>
+              <a:buChar char="Ø"/>
+            </a:pPr>
+            <a:r>
+              <a:rPr lang="en-GB" dirty="0"/>
+              <a:t>Despite its widespread usage, Huffman cannot be used for our set of time series data</a:t>
+            </a:r>
+          </a:p>
+        </p:txBody>
+      </p:sp>
     </p:spTree>
     <p:extLst>
       <p:ext uri="{BB962C8B-B14F-4D97-AF65-F5344CB8AC3E}">
@@ -13004,12 +13128,62 @@
             <p:ph idx="1"/>
           </p:nvPr>
         </p:nvSpPr>
-        <p:spPr/>
+        <p:spPr>
+          <a:xfrm>
+            <a:off x="773768" y="1811142"/>
+            <a:ext cx="9905999" cy="3541714"/>
+          </a:xfrm>
+        </p:spPr>
         <p:txBody>
           <a:bodyPr/>
           <a:lstStyle/>
           <a:p>
-            <a:endParaRPr lang="en-GB"/>
+            <a:pPr>
+              <a:buFont typeface="Wingdings" panose="05000000000000000000" pitchFamily="2" charset="2"/>
+              <a:buChar char="Ø"/>
+            </a:pPr>
+            <a:endParaRPr lang="en-GB" dirty="0"/>
+          </a:p>
+          <a:p>
+            <a:pPr>
+              <a:buFont typeface="Wingdings" panose="05000000000000000000" pitchFamily="2" charset="2"/>
+              <a:buChar char="Ø"/>
+            </a:pPr>
+            <a:endParaRPr lang="en-GB" dirty="0"/>
+          </a:p>
+          <a:p>
+            <a:pPr>
+              <a:buFont typeface="Wingdings" panose="05000000000000000000" pitchFamily="2" charset="2"/>
+              <a:buChar char="Ø"/>
+            </a:pPr>
+            <a:endParaRPr lang="en-GB" dirty="0"/>
+          </a:p>
+          <a:p>
+            <a:pPr>
+              <a:buFont typeface="Wingdings" panose="05000000000000000000" pitchFamily="2" charset="2"/>
+              <a:buChar char="Ø"/>
+            </a:pPr>
+            <a:endParaRPr lang="en-GB" dirty="0"/>
+          </a:p>
+          <a:p>
+            <a:pPr>
+              <a:buFont typeface="Wingdings" panose="05000000000000000000" pitchFamily="2" charset="2"/>
+              <a:buChar char="Ø"/>
+            </a:pPr>
+            <a:r>
+              <a:rPr lang="en-GB" dirty="0"/>
+              <a:t>Optimal M value inconsistent across axes</a:t>
+            </a:r>
+          </a:p>
+          <a:p>
+            <a:pPr>
+              <a:buFont typeface="Wingdings" panose="05000000000000000000" pitchFamily="2" charset="2"/>
+              <a:buChar char="Ø"/>
+            </a:pPr>
+            <a:r>
+              <a:rPr lang="en-GB" dirty="0"/>
+              <a:t>Provides compression ratio of 31%</a:t>
+            </a:r>
           </a:p>
         </p:txBody>
       </p:sp>
@@ -13034,7 +13208,7 @@
         </p:blipFill>
         <p:spPr>
           <a:xfrm>
-            <a:off x="816290" y="1583515"/>
+            <a:off x="835863" y="1588233"/>
             <a:ext cx="2729060" cy="2436829"/>
           </a:xfrm>
           <a:prstGeom prst="rect">
@@ -13069,7 +13243,7 @@
         </p:blipFill>
         <p:spPr bwMode="auto">
           <a:xfrm>
-            <a:off x="6019766" y="1458034"/>
+            <a:off x="5988433" y="0"/>
             <a:ext cx="4718420" cy="2321902"/>
           </a:xfrm>
           <a:prstGeom prst="rect">
@@ -13114,7 +13288,7 @@
         </p:blipFill>
         <p:spPr bwMode="auto">
           <a:xfrm>
-            <a:off x="691600" y="4020344"/>
+            <a:off x="5988433" y="2248100"/>
             <a:ext cx="4718420" cy="2322285"/>
           </a:xfrm>
           <a:prstGeom prst="rect">
@@ -13159,7 +13333,7 @@
         </p:blipFill>
         <p:spPr bwMode="auto">
           <a:xfrm>
-            <a:off x="6094411" y="4104319"/>
+            <a:off x="5988433" y="4570385"/>
             <a:ext cx="4718420" cy="2321902"/>
           </a:xfrm>
           <a:prstGeom prst="rect">
@@ -13198,7 +13372,7 @@
         </p:blipFill>
         <p:spPr>
           <a:xfrm>
-            <a:off x="4035072" y="1583515"/>
+            <a:off x="3972619" y="1597659"/>
             <a:ext cx="1494972" cy="2436829"/>
           </a:xfrm>
           <a:prstGeom prst="rect">

</xml_diff>

<commit_message>
Update Parth viva presentation.pptx
</commit_message>
<xml_diff>
--- a/Parth viva presentation.pptx
+++ b/Parth viva presentation.pptx
@@ -168,7 +168,7 @@
           <a:noFill/>
           <a:extLst>
             <a:ext uri="{909E8E84-426E-40dd-AFC4-6F175D3DCCD1}">
-              <a14:hiddenFill xmlns="" xmlns:a14="http://schemas.microsoft.com/office/drawing/2010/main">
+              <a14:hiddenFill xmlns:a14="http://schemas.microsoft.com/office/drawing/2010/main" xmlns="">
                 <a:solidFill>
                   <a:srgbClr val="FFFFFF"/>
                 </a:solidFill>
@@ -228,7 +228,7 @@
             </a:ln>
             <a:extLst>
               <a:ext uri="{91240B29-F687-4f45-9708-019B960494DF}">
-                <a14:hiddenLine xmlns="" xmlns:a14="http://schemas.microsoft.com/office/drawing/2010/main" w="9525">
+                <a14:hiddenLine xmlns:a14="http://schemas.microsoft.com/office/drawing/2010/main" xmlns="" w="9525">
                   <a:solidFill>
                     <a:srgbClr val="000000"/>
                   </a:solidFill>
@@ -318,7 +318,7 @@
             </a:ln>
             <a:extLst>
               <a:ext uri="{91240B29-F687-4f45-9708-019B960494DF}">
-                <a14:hiddenLine xmlns="" xmlns:a14="http://schemas.microsoft.com/office/drawing/2010/main" w="9525">
+                <a14:hiddenLine xmlns:a14="http://schemas.microsoft.com/office/drawing/2010/main" xmlns="" w="9525">
                   <a:solidFill>
                     <a:srgbClr val="000000"/>
                   </a:solidFill>
@@ -408,7 +408,7 @@
             </a:ln>
             <a:extLst>
               <a:ext uri="{91240B29-F687-4f45-9708-019B960494DF}">
-                <a14:hiddenLine xmlns="" xmlns:a14="http://schemas.microsoft.com/office/drawing/2010/main" w="9525">
+                <a14:hiddenLine xmlns:a14="http://schemas.microsoft.com/office/drawing/2010/main" xmlns="" w="9525">
                   <a:solidFill>
                     <a:srgbClr val="000000"/>
                   </a:solidFill>
@@ -442,7 +442,7 @@
             </a:ln>
             <a:extLst>
               <a:ext uri="{91240B29-F687-4f45-9708-019B960494DF}">
-                <a14:hiddenLine xmlns="" xmlns:a14="http://schemas.microsoft.com/office/drawing/2010/main" w="9525">
+                <a14:hiddenLine xmlns:a14="http://schemas.microsoft.com/office/drawing/2010/main" xmlns="" w="9525">
                   <a:solidFill>
                     <a:srgbClr val="000000"/>
                   </a:solidFill>
@@ -532,7 +532,7 @@
             </a:ln>
             <a:extLst>
               <a:ext uri="{91240B29-F687-4f45-9708-019B960494DF}">
-                <a14:hiddenLine xmlns="" xmlns:a14="http://schemas.microsoft.com/office/drawing/2010/main" w="9525">
+                <a14:hiddenLine xmlns:a14="http://schemas.microsoft.com/office/drawing/2010/main" xmlns="" w="9525">
                   <a:solidFill>
                     <a:srgbClr val="000000"/>
                   </a:solidFill>
@@ -594,7 +594,7 @@
             </a:ln>
             <a:extLst>
               <a:ext uri="{91240B29-F687-4f45-9708-019B960494DF}">
-                <a14:hiddenLine xmlns="" xmlns:a14="http://schemas.microsoft.com/office/drawing/2010/main" w="9525">
+                <a14:hiddenLine xmlns:a14="http://schemas.microsoft.com/office/drawing/2010/main" xmlns="" w="9525">
                   <a:solidFill>
                     <a:srgbClr val="000000"/>
                   </a:solidFill>
@@ -656,7 +656,7 @@
             </a:ln>
             <a:extLst>
               <a:ext uri="{91240B29-F687-4f45-9708-019B960494DF}">
-                <a14:hiddenLine xmlns="" xmlns:a14="http://schemas.microsoft.com/office/drawing/2010/main" w="9525">
+                <a14:hiddenLine xmlns:a14="http://schemas.microsoft.com/office/drawing/2010/main" xmlns="" w="9525">
                   <a:solidFill>
                     <a:srgbClr val="000000"/>
                   </a:solidFill>
@@ -746,7 +746,7 @@
             </a:ln>
             <a:extLst>
               <a:ext uri="{91240B29-F687-4f45-9708-019B960494DF}">
-                <a14:hiddenLine xmlns="" xmlns:a14="http://schemas.microsoft.com/office/drawing/2010/main" w="9525">
+                <a14:hiddenLine xmlns:a14="http://schemas.microsoft.com/office/drawing/2010/main" xmlns="" w="9525">
                   <a:solidFill>
                     <a:srgbClr val="000000"/>
                   </a:solidFill>
@@ -808,7 +808,7 @@
             </a:ln>
             <a:extLst>
               <a:ext uri="{91240B29-F687-4f45-9708-019B960494DF}">
-                <a14:hiddenLine xmlns="" xmlns:a14="http://schemas.microsoft.com/office/drawing/2010/main" w="9525">
+                <a14:hiddenLine xmlns:a14="http://schemas.microsoft.com/office/drawing/2010/main" xmlns="" w="9525">
                   <a:solidFill>
                     <a:srgbClr val="000000"/>
                   </a:solidFill>
@@ -870,7 +870,7 @@
             </a:ln>
             <a:extLst>
               <a:ext uri="{91240B29-F687-4f45-9708-019B960494DF}">
-                <a14:hiddenLine xmlns="" xmlns:a14="http://schemas.microsoft.com/office/drawing/2010/main" w="9525">
+                <a14:hiddenLine xmlns:a14="http://schemas.microsoft.com/office/drawing/2010/main" xmlns="" w="9525">
                   <a:solidFill>
                     <a:srgbClr val="000000"/>
                   </a:solidFill>
@@ -960,7 +960,7 @@
             </a:ln>
             <a:extLst>
               <a:ext uri="{91240B29-F687-4f45-9708-019B960494DF}">
-                <a14:hiddenLine xmlns="" xmlns:a14="http://schemas.microsoft.com/office/drawing/2010/main" w="9525">
+                <a14:hiddenLine xmlns:a14="http://schemas.microsoft.com/office/drawing/2010/main" xmlns="" w="9525">
                   <a:solidFill>
                     <a:srgbClr val="000000"/>
                   </a:solidFill>
@@ -1050,7 +1050,7 @@
             </a:ln>
             <a:extLst>
               <a:ext uri="{91240B29-F687-4f45-9708-019B960494DF}">
-                <a14:hiddenLine xmlns="" xmlns:a14="http://schemas.microsoft.com/office/drawing/2010/main" w="9525">
+                <a14:hiddenLine xmlns:a14="http://schemas.microsoft.com/office/drawing/2010/main" xmlns="" w="9525">
                   <a:solidFill>
                     <a:srgbClr val="000000"/>
                   </a:solidFill>
@@ -1112,7 +1112,7 @@
             </a:ln>
             <a:extLst>
               <a:ext uri="{91240B29-F687-4f45-9708-019B960494DF}">
-                <a14:hiddenLine xmlns="" xmlns:a14="http://schemas.microsoft.com/office/drawing/2010/main" w="9525">
+                <a14:hiddenLine xmlns:a14="http://schemas.microsoft.com/office/drawing/2010/main" xmlns="" w="9525">
                   <a:solidFill>
                     <a:srgbClr val="000000"/>
                   </a:solidFill>
@@ -1222,7 +1222,7 @@
             </a:ln>
             <a:extLst>
               <a:ext uri="{91240B29-F687-4f45-9708-019B960494DF}">
-                <a14:hiddenLine xmlns="" xmlns:a14="http://schemas.microsoft.com/office/drawing/2010/main" w="9525">
+                <a14:hiddenLine xmlns:a14="http://schemas.microsoft.com/office/drawing/2010/main" xmlns="" w="9525">
                   <a:solidFill>
                     <a:srgbClr val="000000"/>
                   </a:solidFill>
@@ -1284,7 +1284,7 @@
             </a:ln>
             <a:extLst>
               <a:ext uri="{91240B29-F687-4f45-9708-019B960494DF}">
-                <a14:hiddenLine xmlns="" xmlns:a14="http://schemas.microsoft.com/office/drawing/2010/main" w="9525">
+                <a14:hiddenLine xmlns:a14="http://schemas.microsoft.com/office/drawing/2010/main" xmlns="" w="9525">
                   <a:solidFill>
                     <a:srgbClr val="000000"/>
                   </a:solidFill>
@@ -1374,7 +1374,7 @@
             </a:ln>
             <a:extLst>
               <a:ext uri="{91240B29-F687-4f45-9708-019B960494DF}">
-                <a14:hiddenLine xmlns="" xmlns:a14="http://schemas.microsoft.com/office/drawing/2010/main" w="9525">
+                <a14:hiddenLine xmlns:a14="http://schemas.microsoft.com/office/drawing/2010/main" xmlns="" w="9525">
                   <a:solidFill>
                     <a:srgbClr val="000000"/>
                   </a:solidFill>
@@ -1464,7 +1464,7 @@
             </a:ln>
             <a:extLst>
               <a:ext uri="{91240B29-F687-4f45-9708-019B960494DF}">
-                <a14:hiddenLine xmlns="" xmlns:a14="http://schemas.microsoft.com/office/drawing/2010/main" w="9525">
+                <a14:hiddenLine xmlns:a14="http://schemas.microsoft.com/office/drawing/2010/main" xmlns="" w="9525">
                   <a:solidFill>
                     <a:srgbClr val="000000"/>
                   </a:solidFill>
@@ -1526,7 +1526,7 @@
             </a:ln>
             <a:extLst>
               <a:ext uri="{91240B29-F687-4f45-9708-019B960494DF}">
-                <a14:hiddenLine xmlns="" xmlns:a14="http://schemas.microsoft.com/office/drawing/2010/main" w="9525">
+                <a14:hiddenLine xmlns:a14="http://schemas.microsoft.com/office/drawing/2010/main" xmlns="" w="9525">
                   <a:solidFill>
                     <a:srgbClr val="000000"/>
                   </a:solidFill>
@@ -1616,7 +1616,7 @@
             </a:ln>
             <a:extLst>
               <a:ext uri="{91240B29-F687-4f45-9708-019B960494DF}">
-                <a14:hiddenLine xmlns="" xmlns:a14="http://schemas.microsoft.com/office/drawing/2010/main" w="9525">
+                <a14:hiddenLine xmlns:a14="http://schemas.microsoft.com/office/drawing/2010/main" xmlns="" w="9525">
                   <a:solidFill>
                     <a:srgbClr val="000000"/>
                   </a:solidFill>
@@ -1706,7 +1706,7 @@
             </a:ln>
             <a:extLst>
               <a:ext uri="{91240B29-F687-4f45-9708-019B960494DF}">
-                <a14:hiddenLine xmlns="" xmlns:a14="http://schemas.microsoft.com/office/drawing/2010/main" w="9525">
+                <a14:hiddenLine xmlns:a14="http://schemas.microsoft.com/office/drawing/2010/main" xmlns="" w="9525">
                   <a:solidFill>
                     <a:srgbClr val="000000"/>
                   </a:solidFill>
@@ -1762,7 +1762,7 @@
             </a:ln>
             <a:extLst>
               <a:ext uri="{91240B29-F687-4f45-9708-019B960494DF}">
-                <a14:hiddenLine xmlns="" xmlns:a14="http://schemas.microsoft.com/office/drawing/2010/main" w="9525">
+                <a14:hiddenLine xmlns:a14="http://schemas.microsoft.com/office/drawing/2010/main" xmlns="" w="9525">
                   <a:solidFill>
                     <a:srgbClr val="000000"/>
                   </a:solidFill>
@@ -1852,7 +1852,7 @@
             </a:ln>
             <a:extLst>
               <a:ext uri="{91240B29-F687-4f45-9708-019B960494DF}">
-                <a14:hiddenLine xmlns="" xmlns:a14="http://schemas.microsoft.com/office/drawing/2010/main" w="9525">
+                <a14:hiddenLine xmlns:a14="http://schemas.microsoft.com/office/drawing/2010/main" xmlns="" w="9525">
                   <a:solidFill>
                     <a:srgbClr val="000000"/>
                   </a:solidFill>
@@ -1908,7 +1908,7 @@
             </a:ln>
             <a:extLst>
               <a:ext uri="{91240B29-F687-4f45-9708-019B960494DF}">
-                <a14:hiddenLine xmlns="" xmlns:a14="http://schemas.microsoft.com/office/drawing/2010/main" w="9525">
+                <a14:hiddenLine xmlns:a14="http://schemas.microsoft.com/office/drawing/2010/main" xmlns="" w="9525">
                   <a:solidFill>
                     <a:srgbClr val="000000"/>
                   </a:solidFill>
@@ -1998,7 +1998,7 @@
             </a:ln>
             <a:extLst>
               <a:ext uri="{91240B29-F687-4f45-9708-019B960494DF}">
-                <a14:hiddenLine xmlns="" xmlns:a14="http://schemas.microsoft.com/office/drawing/2010/main" w="9525">
+                <a14:hiddenLine xmlns:a14="http://schemas.microsoft.com/office/drawing/2010/main" xmlns="" w="9525">
                   <a:solidFill>
                     <a:srgbClr val="000000"/>
                   </a:solidFill>
@@ -2066,7 +2066,7 @@
             </a:ln>
             <a:extLst>
               <a:ext uri="{91240B29-F687-4f45-9708-019B960494DF}">
-                <a14:hiddenLine xmlns="" xmlns:a14="http://schemas.microsoft.com/office/drawing/2010/main" w="9525">
+                <a14:hiddenLine xmlns:a14="http://schemas.microsoft.com/office/drawing/2010/main" xmlns="" w="9525">
                   <a:solidFill>
                     <a:srgbClr val="000000"/>
                   </a:solidFill>
@@ -2156,7 +2156,7 @@
             </a:ln>
             <a:extLst>
               <a:ext uri="{91240B29-F687-4f45-9708-019B960494DF}">
-                <a14:hiddenLine xmlns="" xmlns:a14="http://schemas.microsoft.com/office/drawing/2010/main" w="9525">
+                <a14:hiddenLine xmlns:a14="http://schemas.microsoft.com/office/drawing/2010/main" xmlns="" w="9525">
                   <a:solidFill>
                     <a:srgbClr val="000000"/>
                   </a:solidFill>
@@ -2224,7 +2224,7 @@
             </a:ln>
             <a:extLst>
               <a:ext uri="{91240B29-F687-4f45-9708-019B960494DF}">
-                <a14:hiddenLine xmlns="" xmlns:a14="http://schemas.microsoft.com/office/drawing/2010/main" w="9525">
+                <a14:hiddenLine xmlns:a14="http://schemas.microsoft.com/office/drawing/2010/main" xmlns="" w="9525">
                   <a:solidFill>
                     <a:srgbClr val="000000"/>
                   </a:solidFill>
@@ -2314,7 +2314,7 @@
             </a:ln>
             <a:extLst>
               <a:ext uri="{91240B29-F687-4f45-9708-019B960494DF}">
-                <a14:hiddenLine xmlns="" xmlns:a14="http://schemas.microsoft.com/office/drawing/2010/main" w="9525">
+                <a14:hiddenLine xmlns:a14="http://schemas.microsoft.com/office/drawing/2010/main" xmlns="" w="9525">
                   <a:solidFill>
                     <a:srgbClr val="000000"/>
                   </a:solidFill>
@@ -2348,7 +2348,7 @@
             </a:ln>
             <a:extLst>
               <a:ext uri="{91240B29-F687-4f45-9708-019B960494DF}">
-                <a14:hiddenLine xmlns="" xmlns:a14="http://schemas.microsoft.com/office/drawing/2010/main" w="9525">
+                <a14:hiddenLine xmlns:a14="http://schemas.microsoft.com/office/drawing/2010/main" xmlns="" w="9525">
                   <a:solidFill>
                     <a:srgbClr val="000000"/>
                   </a:solidFill>
@@ -2438,7 +2438,7 @@
             </a:ln>
             <a:extLst>
               <a:ext uri="{91240B29-F687-4f45-9708-019B960494DF}">
-                <a14:hiddenLine xmlns="" xmlns:a14="http://schemas.microsoft.com/office/drawing/2010/main" w="9525">
+                <a14:hiddenLine xmlns:a14="http://schemas.microsoft.com/office/drawing/2010/main" xmlns="" w="9525">
                   <a:solidFill>
                     <a:srgbClr val="000000"/>
                   </a:solidFill>
@@ -2500,7 +2500,7 @@
             </a:ln>
             <a:extLst>
               <a:ext uri="{91240B29-F687-4f45-9708-019B960494DF}">
-                <a14:hiddenLine xmlns="" xmlns:a14="http://schemas.microsoft.com/office/drawing/2010/main" w="9525">
+                <a14:hiddenLine xmlns:a14="http://schemas.microsoft.com/office/drawing/2010/main" xmlns="" w="9525">
                   <a:solidFill>
                     <a:srgbClr val="000000"/>
                   </a:solidFill>
@@ -2562,7 +2562,7 @@
             </a:ln>
             <a:extLst>
               <a:ext uri="{91240B29-F687-4f45-9708-019B960494DF}">
-                <a14:hiddenLine xmlns="" xmlns:a14="http://schemas.microsoft.com/office/drawing/2010/main" w="9525">
+                <a14:hiddenLine xmlns:a14="http://schemas.microsoft.com/office/drawing/2010/main" xmlns="" w="9525">
                   <a:solidFill>
                     <a:srgbClr val="000000"/>
                   </a:solidFill>
@@ -2652,7 +2652,7 @@
             </a:ln>
             <a:extLst>
               <a:ext uri="{91240B29-F687-4f45-9708-019B960494DF}">
-                <a14:hiddenLine xmlns="" xmlns:a14="http://schemas.microsoft.com/office/drawing/2010/main" w="9525">
+                <a14:hiddenLine xmlns:a14="http://schemas.microsoft.com/office/drawing/2010/main" xmlns="" w="9525">
                   <a:solidFill>
                     <a:srgbClr val="000000"/>
                   </a:solidFill>
@@ -2720,7 +2720,7 @@
             </a:ln>
             <a:extLst>
               <a:ext uri="{91240B29-F687-4f45-9708-019B960494DF}">
-                <a14:hiddenLine xmlns="" xmlns:a14="http://schemas.microsoft.com/office/drawing/2010/main" w="9525">
+                <a14:hiddenLine xmlns:a14="http://schemas.microsoft.com/office/drawing/2010/main" xmlns="" w="9525">
                   <a:solidFill>
                     <a:srgbClr val="000000"/>
                   </a:solidFill>
@@ -2782,7 +2782,7 @@
             </a:ln>
             <a:extLst>
               <a:ext uri="{91240B29-F687-4f45-9708-019B960494DF}">
-                <a14:hiddenLine xmlns="" xmlns:a14="http://schemas.microsoft.com/office/drawing/2010/main" w="9525">
+                <a14:hiddenLine xmlns:a14="http://schemas.microsoft.com/office/drawing/2010/main" xmlns="" w="9525">
                   <a:solidFill>
                     <a:srgbClr val="000000"/>
                   </a:solidFill>
@@ -2872,7 +2872,7 @@
             </a:ln>
             <a:extLst>
               <a:ext uri="{91240B29-F687-4f45-9708-019B960494DF}">
-                <a14:hiddenLine xmlns="" xmlns:a14="http://schemas.microsoft.com/office/drawing/2010/main" w="9525">
+                <a14:hiddenLine xmlns:a14="http://schemas.microsoft.com/office/drawing/2010/main" xmlns="" w="9525">
                   <a:solidFill>
                     <a:srgbClr val="000000"/>
                   </a:solidFill>
@@ -2934,7 +2934,7 @@
             </a:ln>
             <a:extLst>
               <a:ext uri="{91240B29-F687-4f45-9708-019B960494DF}">
-                <a14:hiddenLine xmlns="" xmlns:a14="http://schemas.microsoft.com/office/drawing/2010/main" w="9525">
+                <a14:hiddenLine xmlns:a14="http://schemas.microsoft.com/office/drawing/2010/main" xmlns="" w="9525">
                   <a:solidFill>
                     <a:srgbClr val="000000"/>
                   </a:solidFill>
@@ -3024,7 +3024,7 @@
             </a:ln>
             <a:extLst>
               <a:ext uri="{91240B29-F687-4f45-9708-019B960494DF}">
-                <a14:hiddenLine xmlns="" xmlns:a14="http://schemas.microsoft.com/office/drawing/2010/main" w="9525">
+                <a14:hiddenLine xmlns:a14="http://schemas.microsoft.com/office/drawing/2010/main" xmlns="" w="9525">
                   <a:solidFill>
                     <a:srgbClr val="000000"/>
                   </a:solidFill>
@@ -3086,7 +3086,7 @@
             </a:ln>
             <a:extLst>
               <a:ext uri="{91240B29-F687-4f45-9708-019B960494DF}">
-                <a14:hiddenLine xmlns="" xmlns:a14="http://schemas.microsoft.com/office/drawing/2010/main" w="9525">
+                <a14:hiddenLine xmlns:a14="http://schemas.microsoft.com/office/drawing/2010/main" xmlns="" w="9525">
                   <a:solidFill>
                     <a:srgbClr val="000000"/>
                   </a:solidFill>
@@ -3176,7 +3176,7 @@
             </a:ln>
             <a:extLst>
               <a:ext uri="{91240B29-F687-4f45-9708-019B960494DF}">
-                <a14:hiddenLine xmlns="" xmlns:a14="http://schemas.microsoft.com/office/drawing/2010/main" w="9525">
+                <a14:hiddenLine xmlns:a14="http://schemas.microsoft.com/office/drawing/2010/main" xmlns="" w="9525">
                   <a:solidFill>
                     <a:srgbClr val="000000"/>
                   </a:solidFill>
@@ -3210,7 +3210,7 @@
             </a:ln>
             <a:extLst>
               <a:ext uri="{91240B29-F687-4f45-9708-019B960494DF}">
-                <a14:hiddenLine xmlns="" xmlns:a14="http://schemas.microsoft.com/office/drawing/2010/main" w="9525">
+                <a14:hiddenLine xmlns:a14="http://schemas.microsoft.com/office/drawing/2010/main" xmlns="" w="9525">
                   <a:solidFill>
                     <a:srgbClr val="000000"/>
                   </a:solidFill>
@@ -3275,7 +3275,7 @@
             </a:ln>
             <a:extLst>
               <a:ext uri="{91240B29-F687-4f45-9708-019B960494DF}">
-                <a14:hiddenLine xmlns="" xmlns:a14="http://schemas.microsoft.com/office/drawing/2010/main" w="9525">
+                <a14:hiddenLine xmlns:a14="http://schemas.microsoft.com/office/drawing/2010/main" xmlns="" w="9525">
                   <a:solidFill>
                     <a:srgbClr val="000000"/>
                   </a:solidFill>
@@ -3365,7 +3365,7 @@
             </a:ln>
             <a:extLst>
               <a:ext uri="{91240B29-F687-4f45-9708-019B960494DF}">
-                <a14:hiddenLine xmlns="" xmlns:a14="http://schemas.microsoft.com/office/drawing/2010/main" w="9525">
+                <a14:hiddenLine xmlns:a14="http://schemas.microsoft.com/office/drawing/2010/main" xmlns="" w="9525">
                   <a:solidFill>
                     <a:srgbClr val="000000"/>
                   </a:solidFill>
@@ -3427,7 +3427,7 @@
             </a:ln>
             <a:extLst>
               <a:ext uri="{91240B29-F687-4f45-9708-019B960494DF}">
-                <a14:hiddenLine xmlns="" xmlns:a14="http://schemas.microsoft.com/office/drawing/2010/main" w="9525">
+                <a14:hiddenLine xmlns:a14="http://schemas.microsoft.com/office/drawing/2010/main" xmlns="" w="9525">
                   <a:solidFill>
                     <a:srgbClr val="000000"/>
                   </a:solidFill>
@@ -3517,7 +3517,7 @@
             </a:ln>
             <a:extLst>
               <a:ext uri="{91240B29-F687-4f45-9708-019B960494DF}">
-                <a14:hiddenLine xmlns="" xmlns:a14="http://schemas.microsoft.com/office/drawing/2010/main" w="9525">
+                <a14:hiddenLine xmlns:a14="http://schemas.microsoft.com/office/drawing/2010/main" xmlns="" w="9525">
                   <a:solidFill>
                     <a:srgbClr val="000000"/>
                   </a:solidFill>
@@ -3607,7 +3607,7 @@
             </a:ln>
             <a:extLst>
               <a:ext uri="{91240B29-F687-4f45-9708-019B960494DF}">
-                <a14:hiddenLine xmlns="" xmlns:a14="http://schemas.microsoft.com/office/drawing/2010/main" w="9525">
+                <a14:hiddenLine xmlns:a14="http://schemas.microsoft.com/office/drawing/2010/main" xmlns="" w="9525">
                   <a:solidFill>
                     <a:srgbClr val="000000"/>
                   </a:solidFill>
@@ -3672,7 +3672,7 @@
             </a:ln>
             <a:extLst>
               <a:ext uri="{91240B29-F687-4f45-9708-019B960494DF}">
-                <a14:hiddenLine xmlns="" xmlns:a14="http://schemas.microsoft.com/office/drawing/2010/main" w="9525">
+                <a14:hiddenLine xmlns:a14="http://schemas.microsoft.com/office/drawing/2010/main" xmlns="" w="9525">
                   <a:solidFill>
                     <a:srgbClr val="000000"/>
                   </a:solidFill>
@@ -3734,7 +3734,7 @@
             </a:ln>
             <a:extLst>
               <a:ext uri="{91240B29-F687-4f45-9708-019B960494DF}">
-                <a14:hiddenLine xmlns="" xmlns:a14="http://schemas.microsoft.com/office/drawing/2010/main" w="9525">
+                <a14:hiddenLine xmlns:a14="http://schemas.microsoft.com/office/drawing/2010/main" xmlns="" w="9525">
                   <a:solidFill>
                     <a:srgbClr val="000000"/>
                   </a:solidFill>
@@ -3824,7 +3824,7 @@
             </a:ln>
             <a:extLst>
               <a:ext uri="{91240B29-F687-4f45-9708-019B960494DF}">
-                <a14:hiddenLine xmlns="" xmlns:a14="http://schemas.microsoft.com/office/drawing/2010/main" w="9525">
+                <a14:hiddenLine xmlns:a14="http://schemas.microsoft.com/office/drawing/2010/main" xmlns="" w="9525">
                   <a:solidFill>
                     <a:srgbClr val="000000"/>
                   </a:solidFill>
@@ -3914,7 +3914,7 @@
             </a:ln>
             <a:extLst>
               <a:ext uri="{91240B29-F687-4f45-9708-019B960494DF}">
-                <a14:hiddenLine xmlns="" xmlns:a14="http://schemas.microsoft.com/office/drawing/2010/main" w="9525">
+                <a14:hiddenLine xmlns:a14="http://schemas.microsoft.com/office/drawing/2010/main" xmlns="" w="9525">
                   <a:solidFill>
                     <a:srgbClr val="000000"/>
                   </a:solidFill>
@@ -3976,7 +3976,7 @@
             </a:ln>
             <a:extLst>
               <a:ext uri="{91240B29-F687-4f45-9708-019B960494DF}">
-                <a14:hiddenLine xmlns="" xmlns:a14="http://schemas.microsoft.com/office/drawing/2010/main" w="9525">
+                <a14:hiddenLine xmlns:a14="http://schemas.microsoft.com/office/drawing/2010/main" xmlns="" w="9525">
                   <a:solidFill>
                     <a:srgbClr val="000000"/>
                   </a:solidFill>
@@ -4096,7 +4096,7 @@
             </a:ln>
             <a:extLst>
               <a:ext uri="{91240B29-F687-4f45-9708-019B960494DF}">
-                <a14:hiddenLine xmlns="" xmlns:a14="http://schemas.microsoft.com/office/drawing/2010/main" w="9525">
+                <a14:hiddenLine xmlns:a14="http://schemas.microsoft.com/office/drawing/2010/main" xmlns="" w="9525">
                   <a:solidFill>
                     <a:srgbClr val="000000"/>
                   </a:solidFill>
@@ -4164,7 +4164,7 @@
             </a:ln>
             <a:extLst>
               <a:ext uri="{91240B29-F687-4f45-9708-019B960494DF}">
-                <a14:hiddenLine xmlns="" xmlns:a14="http://schemas.microsoft.com/office/drawing/2010/main" w="9525">
+                <a14:hiddenLine xmlns:a14="http://schemas.microsoft.com/office/drawing/2010/main" xmlns="" w="9525">
                   <a:solidFill>
                     <a:srgbClr val="000000"/>
                   </a:solidFill>
@@ -4254,7 +4254,7 @@
             </a:ln>
             <a:extLst>
               <a:ext uri="{91240B29-F687-4f45-9708-019B960494DF}">
-                <a14:hiddenLine xmlns="" xmlns:a14="http://schemas.microsoft.com/office/drawing/2010/main" w="9525">
+                <a14:hiddenLine xmlns:a14="http://schemas.microsoft.com/office/drawing/2010/main" xmlns="" w="9525">
                   <a:solidFill>
                     <a:srgbClr val="000000"/>
                   </a:solidFill>
@@ -9061,7 +9061,7 @@
           <a:noFill/>
           <a:extLst>
             <a:ext uri="{909E8E84-426E-40dd-AFC4-6F175D3DCCD1}">
-              <a14:hiddenFill xmlns="" xmlns:a14="http://schemas.microsoft.com/office/drawing/2010/main">
+              <a14:hiddenFill xmlns:a14="http://schemas.microsoft.com/office/drawing/2010/main" xmlns="">
                 <a:solidFill>
                   <a:srgbClr val="FFFFFF"/>
                 </a:solidFill>
@@ -9135,7 +9135,7 @@
               </a:ln>
               <a:extLst>
                 <a:ext uri="{91240B29-F687-4f45-9708-019B960494DF}">
-                  <a14:hiddenLine xmlns="" xmlns:a14="http://schemas.microsoft.com/office/drawing/2010/main" w="9525">
+                  <a14:hiddenLine xmlns:a14="http://schemas.microsoft.com/office/drawing/2010/main" xmlns="" w="9525">
                     <a:solidFill>
                       <a:srgbClr val="000000"/>
                     </a:solidFill>
@@ -9225,7 +9225,7 @@
               </a:ln>
               <a:extLst>
                 <a:ext uri="{91240B29-F687-4f45-9708-019B960494DF}">
-                  <a14:hiddenLine xmlns="" xmlns:a14="http://schemas.microsoft.com/office/drawing/2010/main" w="9525">
+                  <a14:hiddenLine xmlns:a14="http://schemas.microsoft.com/office/drawing/2010/main" xmlns="" w="9525">
                     <a:solidFill>
                       <a:srgbClr val="000000"/>
                     </a:solidFill>
@@ -9315,7 +9315,7 @@
               </a:ln>
               <a:extLst>
                 <a:ext uri="{91240B29-F687-4f45-9708-019B960494DF}">
-                  <a14:hiddenLine xmlns="" xmlns:a14="http://schemas.microsoft.com/office/drawing/2010/main" w="9525">
+                  <a14:hiddenLine xmlns:a14="http://schemas.microsoft.com/office/drawing/2010/main" xmlns="" w="9525">
                     <a:solidFill>
                       <a:srgbClr val="000000"/>
                     </a:solidFill>
@@ -9377,7 +9377,7 @@
               </a:ln>
               <a:extLst>
                 <a:ext uri="{91240B29-F687-4f45-9708-019B960494DF}">
-                  <a14:hiddenLine xmlns="" xmlns:a14="http://schemas.microsoft.com/office/drawing/2010/main" w="9525">
+                  <a14:hiddenLine xmlns:a14="http://schemas.microsoft.com/office/drawing/2010/main" xmlns="" w="9525">
                     <a:solidFill>
                       <a:srgbClr val="000000"/>
                     </a:solidFill>
@@ -9467,7 +9467,7 @@
               </a:ln>
               <a:extLst>
                 <a:ext uri="{91240B29-F687-4f45-9708-019B960494DF}">
-                  <a14:hiddenLine xmlns="" xmlns:a14="http://schemas.microsoft.com/office/drawing/2010/main" w="9525">
+                  <a14:hiddenLine xmlns:a14="http://schemas.microsoft.com/office/drawing/2010/main" xmlns="" w="9525">
                     <a:solidFill>
                       <a:srgbClr val="000000"/>
                     </a:solidFill>
@@ -9529,7 +9529,7 @@
               </a:ln>
               <a:extLst>
                 <a:ext uri="{91240B29-F687-4f45-9708-019B960494DF}">
-                  <a14:hiddenLine xmlns="" xmlns:a14="http://schemas.microsoft.com/office/drawing/2010/main" w="9525">
+                  <a14:hiddenLine xmlns:a14="http://schemas.microsoft.com/office/drawing/2010/main" xmlns="" w="9525">
                     <a:solidFill>
                       <a:srgbClr val="000000"/>
                     </a:solidFill>
@@ -9591,7 +9591,7 @@
               </a:ln>
               <a:extLst>
                 <a:ext uri="{91240B29-F687-4f45-9708-019B960494DF}">
-                  <a14:hiddenLine xmlns="" xmlns:a14="http://schemas.microsoft.com/office/drawing/2010/main" w="9525">
+                  <a14:hiddenLine xmlns:a14="http://schemas.microsoft.com/office/drawing/2010/main" xmlns="" w="9525">
                     <a:solidFill>
                       <a:srgbClr val="000000"/>
                     </a:solidFill>
@@ -9681,7 +9681,7 @@
               </a:ln>
               <a:extLst>
                 <a:ext uri="{91240B29-F687-4f45-9708-019B960494DF}">
-                  <a14:hiddenLine xmlns="" xmlns:a14="http://schemas.microsoft.com/office/drawing/2010/main" w="9525">
+                  <a14:hiddenLine xmlns:a14="http://schemas.microsoft.com/office/drawing/2010/main" xmlns="" w="9525">
                     <a:solidFill>
                       <a:srgbClr val="000000"/>
                     </a:solidFill>
@@ -9771,7 +9771,7 @@
               </a:ln>
               <a:extLst>
                 <a:ext uri="{91240B29-F687-4f45-9708-019B960494DF}">
-                  <a14:hiddenLine xmlns="" xmlns:a14="http://schemas.microsoft.com/office/drawing/2010/main" w="9525">
+                  <a14:hiddenLine xmlns:a14="http://schemas.microsoft.com/office/drawing/2010/main" xmlns="" w="9525">
                     <a:solidFill>
                       <a:srgbClr val="000000"/>
                     </a:solidFill>
@@ -9833,7 +9833,7 @@
               </a:ln>
               <a:extLst>
                 <a:ext uri="{91240B29-F687-4f45-9708-019B960494DF}">
-                  <a14:hiddenLine xmlns="" xmlns:a14="http://schemas.microsoft.com/office/drawing/2010/main" w="9525">
+                  <a14:hiddenLine xmlns:a14="http://schemas.microsoft.com/office/drawing/2010/main" xmlns="" w="9525">
                     <a:solidFill>
                       <a:srgbClr val="000000"/>
                     </a:solidFill>
@@ -9943,7 +9943,7 @@
               </a:ln>
               <a:extLst>
                 <a:ext uri="{91240B29-F687-4f45-9708-019B960494DF}">
-                  <a14:hiddenLine xmlns="" xmlns:a14="http://schemas.microsoft.com/office/drawing/2010/main" w="9525">
+                  <a14:hiddenLine xmlns:a14="http://schemas.microsoft.com/office/drawing/2010/main" xmlns="" w="9525">
                     <a:solidFill>
                       <a:srgbClr val="000000"/>
                     </a:solidFill>
@@ -10027,7 +10027,7 @@
               </a:ln>
               <a:extLst>
                 <a:ext uri="{91240B29-F687-4f45-9708-019B960494DF}">
-                  <a14:hiddenLine xmlns="" xmlns:a14="http://schemas.microsoft.com/office/drawing/2010/main" w="9525">
+                  <a14:hiddenLine xmlns:a14="http://schemas.microsoft.com/office/drawing/2010/main" xmlns="" w="9525">
                     <a:solidFill>
                       <a:srgbClr val="000000"/>
                     </a:solidFill>
@@ -10089,7 +10089,7 @@
               </a:ln>
               <a:extLst>
                 <a:ext uri="{91240B29-F687-4f45-9708-019B960494DF}">
-                  <a14:hiddenLine xmlns="" xmlns:a14="http://schemas.microsoft.com/office/drawing/2010/main" w="9525">
+                  <a14:hiddenLine xmlns:a14="http://schemas.microsoft.com/office/drawing/2010/main" xmlns="" w="9525">
                     <a:solidFill>
                       <a:srgbClr val="000000"/>
                     </a:solidFill>
@@ -10151,7 +10151,7 @@
               </a:ln>
               <a:extLst>
                 <a:ext uri="{91240B29-F687-4f45-9708-019B960494DF}">
-                  <a14:hiddenLine xmlns="" xmlns:a14="http://schemas.microsoft.com/office/drawing/2010/main" w="9525">
+                  <a14:hiddenLine xmlns:a14="http://schemas.microsoft.com/office/drawing/2010/main" xmlns="" w="9525">
                     <a:solidFill>
                       <a:srgbClr val="000000"/>
                     </a:solidFill>
@@ -10241,7 +10241,7 @@
               </a:ln>
               <a:extLst>
                 <a:ext uri="{91240B29-F687-4f45-9708-019B960494DF}">
-                  <a14:hiddenLine xmlns="" xmlns:a14="http://schemas.microsoft.com/office/drawing/2010/main" w="9525">
+                  <a14:hiddenLine xmlns:a14="http://schemas.microsoft.com/office/drawing/2010/main" xmlns="" w="9525">
                     <a:solidFill>
                       <a:srgbClr val="000000"/>
                     </a:solidFill>
@@ -10275,7 +10275,7 @@
               </a:ln>
               <a:extLst>
                 <a:ext uri="{91240B29-F687-4f45-9708-019B960494DF}">
-                  <a14:hiddenLine xmlns="" xmlns:a14="http://schemas.microsoft.com/office/drawing/2010/main" w="9525">
+                  <a14:hiddenLine xmlns:a14="http://schemas.microsoft.com/office/drawing/2010/main" xmlns="" w="9525">
                     <a:solidFill>
                       <a:srgbClr val="000000"/>
                     </a:solidFill>
@@ -10340,7 +10340,7 @@
               </a:ln>
               <a:extLst>
                 <a:ext uri="{91240B29-F687-4f45-9708-019B960494DF}">
-                  <a14:hiddenLine xmlns="" xmlns:a14="http://schemas.microsoft.com/office/drawing/2010/main" w="9525">
+                  <a14:hiddenLine xmlns:a14="http://schemas.microsoft.com/office/drawing/2010/main" xmlns="" w="9525">
                     <a:solidFill>
                       <a:srgbClr val="000000"/>
                     </a:solidFill>
@@ -10430,7 +10430,7 @@
               </a:ln>
               <a:extLst>
                 <a:ext uri="{91240B29-F687-4f45-9708-019B960494DF}">
-                  <a14:hiddenLine xmlns="" xmlns:a14="http://schemas.microsoft.com/office/drawing/2010/main" w="9525">
+                  <a14:hiddenLine xmlns:a14="http://schemas.microsoft.com/office/drawing/2010/main" xmlns="" w="9525">
                     <a:solidFill>
                       <a:srgbClr val="000000"/>
                     </a:solidFill>
@@ -10492,7 +10492,7 @@
               </a:ln>
               <a:extLst>
                 <a:ext uri="{91240B29-F687-4f45-9708-019B960494DF}">
-                  <a14:hiddenLine xmlns="" xmlns:a14="http://schemas.microsoft.com/office/drawing/2010/main" w="9525">
+                  <a14:hiddenLine xmlns:a14="http://schemas.microsoft.com/office/drawing/2010/main" xmlns="" w="9525">
                     <a:solidFill>
                       <a:srgbClr val="000000"/>
                     </a:solidFill>
@@ -10582,7 +10582,7 @@
               </a:ln>
               <a:extLst>
                 <a:ext uri="{91240B29-F687-4f45-9708-019B960494DF}">
-                  <a14:hiddenLine xmlns="" xmlns:a14="http://schemas.microsoft.com/office/drawing/2010/main" w="9525">
+                  <a14:hiddenLine xmlns:a14="http://schemas.microsoft.com/office/drawing/2010/main" xmlns="" w="9525">
                     <a:solidFill>
                       <a:srgbClr val="000000"/>
                     </a:solidFill>
@@ -10647,7 +10647,7 @@
               </a:ln>
               <a:extLst>
                 <a:ext uri="{91240B29-F687-4f45-9708-019B960494DF}">
-                  <a14:hiddenLine xmlns="" xmlns:a14="http://schemas.microsoft.com/office/drawing/2010/main" w="9525">
+                  <a14:hiddenLine xmlns:a14="http://schemas.microsoft.com/office/drawing/2010/main" xmlns="" w="9525">
                     <a:solidFill>
                       <a:srgbClr val="000000"/>
                     </a:solidFill>
@@ -10709,7 +10709,7 @@
               </a:ln>
               <a:extLst>
                 <a:ext uri="{91240B29-F687-4f45-9708-019B960494DF}">
-                  <a14:hiddenLine xmlns="" xmlns:a14="http://schemas.microsoft.com/office/drawing/2010/main" w="9525">
+                  <a14:hiddenLine xmlns:a14="http://schemas.microsoft.com/office/drawing/2010/main" xmlns="" w="9525">
                     <a:solidFill>
                       <a:srgbClr val="000000"/>
                     </a:solidFill>
@@ -10799,7 +10799,7 @@
               </a:ln>
               <a:extLst>
                 <a:ext uri="{91240B29-F687-4f45-9708-019B960494DF}">
-                  <a14:hiddenLine xmlns="" xmlns:a14="http://schemas.microsoft.com/office/drawing/2010/main" w="9525">
+                  <a14:hiddenLine xmlns:a14="http://schemas.microsoft.com/office/drawing/2010/main" xmlns="" w="9525">
                     <a:solidFill>
                       <a:srgbClr val="000000"/>
                     </a:solidFill>
@@ -10889,7 +10889,7 @@
               </a:ln>
               <a:extLst>
                 <a:ext uri="{91240B29-F687-4f45-9708-019B960494DF}">
-                  <a14:hiddenLine xmlns="" xmlns:a14="http://schemas.microsoft.com/office/drawing/2010/main" w="9525">
+                  <a14:hiddenLine xmlns:a14="http://schemas.microsoft.com/office/drawing/2010/main" xmlns="" w="9525">
                     <a:solidFill>
                       <a:srgbClr val="000000"/>
                     </a:solidFill>
@@ -10954,7 +10954,7 @@
               </a:ln>
               <a:extLst>
                 <a:ext uri="{91240B29-F687-4f45-9708-019B960494DF}">
-                  <a14:hiddenLine xmlns="" xmlns:a14="http://schemas.microsoft.com/office/drawing/2010/main" w="9525">
+                  <a14:hiddenLine xmlns:a14="http://schemas.microsoft.com/office/drawing/2010/main" xmlns="" w="9525">
                     <a:solidFill>
                       <a:srgbClr val="000000"/>
                     </a:solidFill>
@@ -11074,7 +11074,7 @@
               </a:ln>
               <a:extLst>
                 <a:ext uri="{91240B29-F687-4f45-9708-019B960494DF}">
-                  <a14:hiddenLine xmlns="" xmlns:a14="http://schemas.microsoft.com/office/drawing/2010/main" w="9525">
+                  <a14:hiddenLine xmlns:a14="http://schemas.microsoft.com/office/drawing/2010/main" xmlns="" w="9525">
                     <a:solidFill>
                       <a:srgbClr val="000000"/>
                     </a:solidFill>
@@ -11172,7 +11172,7 @@
               </a:ln>
               <a:extLst>
                 <a:ext uri="{91240B29-F687-4f45-9708-019B960494DF}">
-                  <a14:hiddenLine xmlns="" xmlns:a14="http://schemas.microsoft.com/office/drawing/2010/main" w="9525">
+                  <a14:hiddenLine xmlns:a14="http://schemas.microsoft.com/office/drawing/2010/main" xmlns="" w="9525">
                     <a:solidFill>
                       <a:srgbClr val="000000"/>
                     </a:solidFill>
@@ -11287,7 +11287,7 @@
               </a:ln>
               <a:extLst>
                 <a:ext uri="{91240B29-F687-4f45-9708-019B960494DF}">
-                  <a14:hiddenLine xmlns="" xmlns:a14="http://schemas.microsoft.com/office/drawing/2010/main" w="9525">
+                  <a14:hiddenLine xmlns:a14="http://schemas.microsoft.com/office/drawing/2010/main" xmlns="" w="9525">
                     <a:solidFill>
                       <a:srgbClr val="000000"/>
                     </a:solidFill>
@@ -11377,7 +11377,7 @@
               </a:ln>
               <a:extLst>
                 <a:ext uri="{91240B29-F687-4f45-9708-019B960494DF}">
-                  <a14:hiddenLine xmlns="" xmlns:a14="http://schemas.microsoft.com/office/drawing/2010/main" w="9525">
+                  <a14:hiddenLine xmlns:a14="http://schemas.microsoft.com/office/drawing/2010/main" xmlns="" w="9525">
                     <a:solidFill>
                       <a:srgbClr val="000000"/>
                     </a:solidFill>
@@ -11442,7 +11442,7 @@
               </a:ln>
               <a:extLst>
                 <a:ext uri="{91240B29-F687-4f45-9708-019B960494DF}">
-                  <a14:hiddenLine xmlns="" xmlns:a14="http://schemas.microsoft.com/office/drawing/2010/main" w="9525">
+                  <a14:hiddenLine xmlns:a14="http://schemas.microsoft.com/office/drawing/2010/main" xmlns="" w="9525">
                     <a:solidFill>
                       <a:srgbClr val="000000"/>
                     </a:solidFill>
@@ -11532,7 +11532,7 @@
               </a:ln>
               <a:extLst>
                 <a:ext uri="{91240B29-F687-4f45-9708-019B960494DF}">
-                  <a14:hiddenLine xmlns="" xmlns:a14="http://schemas.microsoft.com/office/drawing/2010/main" w="9525">
+                  <a14:hiddenLine xmlns:a14="http://schemas.microsoft.com/office/drawing/2010/main" xmlns="" w="9525">
                     <a:solidFill>
                       <a:srgbClr val="000000"/>
                     </a:solidFill>
@@ -11600,7 +11600,7 @@
               </a:ln>
               <a:extLst>
                 <a:ext uri="{91240B29-F687-4f45-9708-019B960494DF}">
-                  <a14:hiddenLine xmlns="" xmlns:a14="http://schemas.microsoft.com/office/drawing/2010/main" w="9525">
+                  <a14:hiddenLine xmlns:a14="http://schemas.microsoft.com/office/drawing/2010/main" xmlns="" w="9525">
                     <a:solidFill>
                       <a:srgbClr val="000000"/>
                     </a:solidFill>
@@ -11690,7 +11690,7 @@
               </a:ln>
               <a:extLst>
                 <a:ext uri="{91240B29-F687-4f45-9708-019B960494DF}">
-                  <a14:hiddenLine xmlns="" xmlns:a14="http://schemas.microsoft.com/office/drawing/2010/main" w="9525">
+                  <a14:hiddenLine xmlns:a14="http://schemas.microsoft.com/office/drawing/2010/main" xmlns="" w="9525">
                     <a:solidFill>
                       <a:srgbClr val="000000"/>
                     </a:solidFill>
@@ -11758,7 +11758,7 @@
               </a:ln>
               <a:extLst>
                 <a:ext uri="{91240B29-F687-4f45-9708-019B960494DF}">
-                  <a14:hiddenLine xmlns="" xmlns:a14="http://schemas.microsoft.com/office/drawing/2010/main" w="9525">
+                  <a14:hiddenLine xmlns:a14="http://schemas.microsoft.com/office/drawing/2010/main" xmlns="" w="9525">
                     <a:solidFill>
                       <a:srgbClr val="000000"/>
                     </a:solidFill>
@@ -11848,7 +11848,7 @@
               </a:ln>
               <a:extLst>
                 <a:ext uri="{91240B29-F687-4f45-9708-019B960494DF}">
-                  <a14:hiddenLine xmlns="" xmlns:a14="http://schemas.microsoft.com/office/drawing/2010/main" w="9525">
+                  <a14:hiddenLine xmlns:a14="http://schemas.microsoft.com/office/drawing/2010/main" xmlns="" w="9525">
                     <a:solidFill>
                       <a:srgbClr val="000000"/>
                     </a:solidFill>
@@ -11882,7 +11882,7 @@
               </a:ln>
               <a:extLst>
                 <a:ext uri="{91240B29-F687-4f45-9708-019B960494DF}">
-                  <a14:hiddenLine xmlns="" xmlns:a14="http://schemas.microsoft.com/office/drawing/2010/main" w="9525">
+                  <a14:hiddenLine xmlns:a14="http://schemas.microsoft.com/office/drawing/2010/main" xmlns="" w="9525">
                     <a:solidFill>
                       <a:srgbClr val="000000"/>
                     </a:solidFill>
@@ -13646,6 +13646,21 @@
               <a:t>Any Questions?</a:t>
             </a:r>
           </a:p>
+          <a:p>
+            <a:pPr marL="0" indent="0">
+              <a:buNone/>
+            </a:pPr>
+            <a:endParaRPr lang="en-GB" dirty="0"/>
+          </a:p>
+          <a:p>
+            <a:pPr marL="0" indent="0">
+              <a:buNone/>
+            </a:pPr>
+            <a:r>
+              <a:rPr lang="en-GB" dirty="0"/>
+              <a:t>Simplify slides, less graphs, explain algorithms with diagrams not words</a:t>
+            </a:r>
+          </a:p>
         </p:txBody>
       </p:sp>
     </p:spTree>

</xml_diff>